<commit_message>
more refactoring, imporved data collection/smoothing
</commit_message>
<xml_diff>
--- a/docs/ApproachVisualization.pptx
+++ b/docs/ApproachVisualization.pptx
@@ -5,10 +5,11 @@
     <p:sldMasterId id="2147483660" r:id="rId1"/>
   </p:sldMasterIdLst>
   <p:sldIdLst>
-    <p:sldId id="256" r:id="rId2"/>
-    <p:sldId id="257" r:id="rId3"/>
-    <p:sldId id="258" r:id="rId4"/>
-    <p:sldId id="259" r:id="rId5"/>
+    <p:sldId id="260" r:id="rId2"/>
+    <p:sldId id="256" r:id="rId3"/>
+    <p:sldId id="257" r:id="rId4"/>
+    <p:sldId id="258" r:id="rId5"/>
+    <p:sldId id="259" r:id="rId6"/>
   </p:sldIdLst>
   <p:sldSz cx="12192000" cy="6858000"/>
   <p:notesSz cx="6858000" cy="9144000"/>
@@ -118,7 +119,7 @@
 <file path=ppt/revisionInfo.xml><?xml version="1.0" encoding="utf-8"?>
 <p1510:revInfo xmlns:a="http://schemas.openxmlformats.org/drawingml/2006/main" xmlns:r="http://schemas.openxmlformats.org/officeDocument/2006/relationships" xmlns:p1510="http://schemas.microsoft.com/office/powerpoint/2015/10/main">
   <p1510:revLst>
-    <p1510:client id="{630B7B4A-A957-391D-1449-6F96F672BAF2}" v="33" dt="2025-01-08T09:05:35.495"/>
+    <p1510:client id="{58BD670C-E094-4601-3F15-A62F7F9CAB9A}" v="339" dt="2025-03-21T09:19:57.717"/>
   </p1510:revLst>
 </p1510:revInfo>
 </file>
@@ -254,7 +255,7 @@
           <a:p>
             <a:fld id="{846CE7D5-CF57-46EF-B807-FDD0502418D4}" type="datetimeFigureOut">
               <a:rPr lang="en-US" smtClean="0"/>
-              <a:t>1/8/2025</a:t>
+              <a:t>3/21/2025</a:t>
             </a:fld>
             <a:endParaRPr lang="en-US"/>
           </a:p>
@@ -424,7 +425,7 @@
           <a:p>
             <a:fld id="{846CE7D5-CF57-46EF-B807-FDD0502418D4}" type="datetimeFigureOut">
               <a:rPr lang="en-US" smtClean="0"/>
-              <a:t>1/8/2025</a:t>
+              <a:t>3/21/2025</a:t>
             </a:fld>
             <a:endParaRPr lang="en-US"/>
           </a:p>
@@ -604,7 +605,7 @@
           <a:p>
             <a:fld id="{846CE7D5-CF57-46EF-B807-FDD0502418D4}" type="datetimeFigureOut">
               <a:rPr lang="en-US" smtClean="0"/>
-              <a:t>1/8/2025</a:t>
+              <a:t>3/21/2025</a:t>
             </a:fld>
             <a:endParaRPr lang="en-US"/>
           </a:p>
@@ -774,7 +775,7 @@
           <a:p>
             <a:fld id="{846CE7D5-CF57-46EF-B807-FDD0502418D4}" type="datetimeFigureOut">
               <a:rPr lang="en-US" smtClean="0"/>
-              <a:t>1/8/2025</a:t>
+              <a:t>3/21/2025</a:t>
             </a:fld>
             <a:endParaRPr lang="en-US"/>
           </a:p>
@@ -1020,7 +1021,7 @@
           <a:p>
             <a:fld id="{846CE7D5-CF57-46EF-B807-FDD0502418D4}" type="datetimeFigureOut">
               <a:rPr lang="en-US" smtClean="0"/>
-              <a:t>1/8/2025</a:t>
+              <a:t>3/21/2025</a:t>
             </a:fld>
             <a:endParaRPr lang="en-US"/>
           </a:p>
@@ -1252,7 +1253,7 @@
           <a:p>
             <a:fld id="{846CE7D5-CF57-46EF-B807-FDD0502418D4}" type="datetimeFigureOut">
               <a:rPr lang="en-US" smtClean="0"/>
-              <a:t>1/8/2025</a:t>
+              <a:t>3/21/2025</a:t>
             </a:fld>
             <a:endParaRPr lang="en-US"/>
           </a:p>
@@ -1619,7 +1620,7 @@
           <a:p>
             <a:fld id="{846CE7D5-CF57-46EF-B807-FDD0502418D4}" type="datetimeFigureOut">
               <a:rPr lang="en-US" smtClean="0"/>
-              <a:t>1/8/2025</a:t>
+              <a:t>3/21/2025</a:t>
             </a:fld>
             <a:endParaRPr lang="en-US"/>
           </a:p>
@@ -1737,7 +1738,7 @@
           <a:p>
             <a:fld id="{846CE7D5-CF57-46EF-B807-FDD0502418D4}" type="datetimeFigureOut">
               <a:rPr lang="en-US" smtClean="0"/>
-              <a:t>1/8/2025</a:t>
+              <a:t>3/21/2025</a:t>
             </a:fld>
             <a:endParaRPr lang="en-US"/>
           </a:p>
@@ -1832,7 +1833,7 @@
           <a:p>
             <a:fld id="{846CE7D5-CF57-46EF-B807-FDD0502418D4}" type="datetimeFigureOut">
               <a:rPr lang="en-US" smtClean="0"/>
-              <a:t>1/8/2025</a:t>
+              <a:t>3/21/2025</a:t>
             </a:fld>
             <a:endParaRPr lang="en-US"/>
           </a:p>
@@ -2109,7 +2110,7 @@
           <a:p>
             <a:fld id="{846CE7D5-CF57-46EF-B807-FDD0502418D4}" type="datetimeFigureOut">
               <a:rPr lang="en-US" smtClean="0"/>
-              <a:t>1/8/2025</a:t>
+              <a:t>3/21/2025</a:t>
             </a:fld>
             <a:endParaRPr lang="en-US"/>
           </a:p>
@@ -2366,7 +2367,7 @@
           <a:p>
             <a:fld id="{846CE7D5-CF57-46EF-B807-FDD0502418D4}" type="datetimeFigureOut">
               <a:rPr lang="en-US" smtClean="0"/>
-              <a:t>1/8/2025</a:t>
+              <a:t>3/21/2025</a:t>
             </a:fld>
             <a:endParaRPr lang="en-US"/>
           </a:p>
@@ -2579,7 +2580,7 @@
           <a:p>
             <a:fld id="{846CE7D5-CF57-46EF-B807-FDD0502418D4}" type="datetimeFigureOut">
               <a:rPr lang="en-US" smtClean="0"/>
-              <a:t>1/8/2025</a:t>
+              <a:t>3/21/2025</a:t>
             </a:fld>
             <a:endParaRPr lang="en-US"/>
           </a:p>
@@ -2972,6 +2973,2486 @@
   <p:cSld>
     <p:spTree>
       <p:nvGrpSpPr>
+        <p:cNvPr id="1" name="">
+          <a:extLst>
+            <a:ext uri="{FF2B5EF4-FFF2-40B4-BE49-F238E27FC236}">
+              <a16:creationId xmlns:a16="http://schemas.microsoft.com/office/drawing/2014/main" id="{48ED3B1B-575B-3D42-8EEE-2114FC8CCCD9}"/>
+            </a:ext>
+          </a:extLst>
+        </p:cNvPr>
+        <p:cNvGrpSpPr/>
+        <p:nvPr/>
+      </p:nvGrpSpPr>
+      <p:grpSpPr>
+        <a:xfrm>
+          <a:off x="0" y="0"/>
+          <a:ext cx="0" cy="0"/>
+          <a:chOff x="0" y="0"/>
+          <a:chExt cx="0" cy="0"/>
+        </a:xfrm>
+      </p:grpSpPr>
+      <p:sp>
+        <p:nvSpPr>
+          <p:cNvPr id="16" name="Rectangle 15">
+            <a:extLst>
+              <a:ext uri="{FF2B5EF4-FFF2-40B4-BE49-F238E27FC236}">
+                <a16:creationId xmlns:a16="http://schemas.microsoft.com/office/drawing/2014/main" id="{4495C8E1-32AA-0CC1-92B3-E727E4B79B73}"/>
+              </a:ext>
+            </a:extLst>
+          </p:cNvPr>
+          <p:cNvSpPr/>
+          <p:nvPr/>
+        </p:nvSpPr>
+        <p:spPr>
+          <a:xfrm>
+            <a:off x="874522" y="2082285"/>
+            <a:ext cx="1846881" cy="1123627"/>
+          </a:xfrm>
+          <a:prstGeom prst="rect">
+            <a:avLst/>
+          </a:prstGeom>
+          <a:noFill/>
+        </p:spPr>
+        <p:style>
+          <a:lnRef idx="2">
+            <a:schemeClr val="accent1">
+              <a:shade val="15000"/>
+            </a:schemeClr>
+          </a:lnRef>
+          <a:fillRef idx="1">
+            <a:schemeClr val="accent1"/>
+          </a:fillRef>
+          <a:effectRef idx="0">
+            <a:schemeClr val="accent1"/>
+          </a:effectRef>
+          <a:fontRef idx="minor">
+            <a:schemeClr val="lt1"/>
+          </a:fontRef>
+        </p:style>
+        <p:txBody>
+          <a:bodyPr rtlCol="0" anchor="ctr"/>
+          <a:lstStyle/>
+          <a:p>
+            <a:pPr algn="ctr"/>
+            <a:r>
+              <a:rPr lang="en-US" dirty="0">
+                <a:solidFill>
+                  <a:schemeClr val="tx1"/>
+                </a:solidFill>
+              </a:rPr>
+              <a:t>0000000000000000000000000000000000000000000000000000</a:t>
+            </a:r>
+          </a:p>
+        </p:txBody>
+      </p:sp>
+      <p:sp>
+        <p:nvSpPr>
+          <p:cNvPr id="2" name="Title 1">
+            <a:extLst>
+              <a:ext uri="{FF2B5EF4-FFF2-40B4-BE49-F238E27FC236}">
+                <a16:creationId xmlns:a16="http://schemas.microsoft.com/office/drawing/2014/main" id="{49C984B6-C79F-1051-C9CF-88D9144CB87D}"/>
+              </a:ext>
+            </a:extLst>
+          </p:cNvPr>
+          <p:cNvSpPr>
+            <a:spLocks noGrp="1"/>
+          </p:cNvSpPr>
+          <p:nvPr>
+            <p:ph type="ctrTitle"/>
+          </p:nvPr>
+        </p:nvSpPr>
+        <p:spPr>
+          <a:xfrm>
+            <a:off x="1524000" y="129480"/>
+            <a:ext cx="9144000" cy="717463"/>
+          </a:xfrm>
+        </p:spPr>
+        <p:txBody>
+          <a:bodyPr/>
+          <a:lstStyle/>
+          <a:p>
+            <a:r>
+              <a:rPr lang="en-US" sz="4000" dirty="0">
+                <a:latin typeface="Calibri"/>
+                <a:ea typeface="Calibri"/>
+                <a:cs typeface="Calibri"/>
+              </a:rPr>
+              <a:t>Traffic anomaly detection</a:t>
+            </a:r>
+          </a:p>
+        </p:txBody>
+      </p:sp>
+      <p:sp>
+        <p:nvSpPr>
+          <p:cNvPr id="7" name="Subtitle 2">
+            <a:extLst>
+              <a:ext uri="{FF2B5EF4-FFF2-40B4-BE49-F238E27FC236}">
+                <a16:creationId xmlns:a16="http://schemas.microsoft.com/office/drawing/2014/main" id="{E0568808-3FEA-13CB-45C9-1687F831DEA6}"/>
+              </a:ext>
+            </a:extLst>
+          </p:cNvPr>
+          <p:cNvSpPr txBox="1">
+            <a:spLocks/>
+          </p:cNvSpPr>
+          <p:nvPr/>
+        </p:nvSpPr>
+        <p:spPr>
+          <a:xfrm>
+            <a:off x="394075" y="928929"/>
+            <a:ext cx="2260170" cy="1009999"/>
+          </a:xfrm>
+          <a:prstGeom prst="rect">
+            <a:avLst/>
+          </a:prstGeom>
+        </p:spPr>
+        <p:txBody>
+          <a:bodyPr vert="horz" lIns="91440" tIns="45720" rIns="91440" bIns="45720" rtlCol="0" anchor="ctr">
+            <a:normAutofit/>
+          </a:bodyPr>
+          <a:lstStyle>
+            <a:lvl1pPr marL="0" indent="0" algn="ctr" defTabSz="914400" rtl="0" eaLnBrk="1" latinLnBrk="0" hangingPunct="1">
+              <a:lnSpc>
+                <a:spcPct val="90000"/>
+              </a:lnSpc>
+              <a:spcBef>
+                <a:spcPts val="1000"/>
+              </a:spcBef>
+              <a:buFont typeface="Arial" panose="020B0604020202020204" pitchFamily="34" charset="0"/>
+              <a:buNone/>
+              <a:defRPr sz="2400" kern="1200">
+                <a:solidFill>
+                  <a:schemeClr val="tx1"/>
+                </a:solidFill>
+                <a:latin typeface="+mn-lt"/>
+                <a:ea typeface="+mn-ea"/>
+                <a:cs typeface="+mn-cs"/>
+              </a:defRPr>
+            </a:lvl1pPr>
+            <a:lvl2pPr marL="457200" indent="0" algn="ctr" defTabSz="914400" rtl="0" eaLnBrk="1" latinLnBrk="0" hangingPunct="1">
+              <a:lnSpc>
+                <a:spcPct val="90000"/>
+              </a:lnSpc>
+              <a:spcBef>
+                <a:spcPts val="500"/>
+              </a:spcBef>
+              <a:buFont typeface="Arial" panose="020B0604020202020204" pitchFamily="34" charset="0"/>
+              <a:buNone/>
+              <a:defRPr sz="2000" kern="1200">
+                <a:solidFill>
+                  <a:schemeClr val="tx1"/>
+                </a:solidFill>
+                <a:latin typeface="+mn-lt"/>
+                <a:ea typeface="+mn-ea"/>
+                <a:cs typeface="+mn-cs"/>
+              </a:defRPr>
+            </a:lvl2pPr>
+            <a:lvl3pPr marL="914400" indent="0" algn="ctr" defTabSz="914400" rtl="0" eaLnBrk="1" latinLnBrk="0" hangingPunct="1">
+              <a:lnSpc>
+                <a:spcPct val="90000"/>
+              </a:lnSpc>
+              <a:spcBef>
+                <a:spcPts val="500"/>
+              </a:spcBef>
+              <a:buFont typeface="Arial" panose="020B0604020202020204" pitchFamily="34" charset="0"/>
+              <a:buNone/>
+              <a:defRPr sz="1800" kern="1200">
+                <a:solidFill>
+                  <a:schemeClr val="tx1"/>
+                </a:solidFill>
+                <a:latin typeface="+mn-lt"/>
+                <a:ea typeface="+mn-ea"/>
+                <a:cs typeface="+mn-cs"/>
+              </a:defRPr>
+            </a:lvl3pPr>
+            <a:lvl4pPr marL="1371600" indent="0" algn="ctr" defTabSz="914400" rtl="0" eaLnBrk="1" latinLnBrk="0" hangingPunct="1">
+              <a:lnSpc>
+                <a:spcPct val="90000"/>
+              </a:lnSpc>
+              <a:spcBef>
+                <a:spcPts val="500"/>
+              </a:spcBef>
+              <a:buFont typeface="Arial" panose="020B0604020202020204" pitchFamily="34" charset="0"/>
+              <a:buNone/>
+              <a:defRPr sz="1600" kern="1200">
+                <a:solidFill>
+                  <a:schemeClr val="tx1"/>
+                </a:solidFill>
+                <a:latin typeface="+mn-lt"/>
+                <a:ea typeface="+mn-ea"/>
+                <a:cs typeface="+mn-cs"/>
+              </a:defRPr>
+            </a:lvl4pPr>
+            <a:lvl5pPr marL="1828800" indent="0" algn="ctr" defTabSz="914400" rtl="0" eaLnBrk="1" latinLnBrk="0" hangingPunct="1">
+              <a:lnSpc>
+                <a:spcPct val="90000"/>
+              </a:lnSpc>
+              <a:spcBef>
+                <a:spcPts val="500"/>
+              </a:spcBef>
+              <a:buFont typeface="Arial" panose="020B0604020202020204" pitchFamily="34" charset="0"/>
+              <a:buNone/>
+              <a:defRPr sz="1600" kern="1200">
+                <a:solidFill>
+                  <a:schemeClr val="tx1"/>
+                </a:solidFill>
+                <a:latin typeface="+mn-lt"/>
+                <a:ea typeface="+mn-ea"/>
+                <a:cs typeface="+mn-cs"/>
+              </a:defRPr>
+            </a:lvl5pPr>
+            <a:lvl6pPr marL="2286000" indent="0" algn="ctr" defTabSz="914400" rtl="0" eaLnBrk="1" latinLnBrk="0" hangingPunct="1">
+              <a:lnSpc>
+                <a:spcPct val="90000"/>
+              </a:lnSpc>
+              <a:spcBef>
+                <a:spcPts val="500"/>
+              </a:spcBef>
+              <a:buFont typeface="Arial" panose="020B0604020202020204" pitchFamily="34" charset="0"/>
+              <a:buNone/>
+              <a:defRPr sz="1600" kern="1200">
+                <a:solidFill>
+                  <a:schemeClr val="tx1"/>
+                </a:solidFill>
+                <a:latin typeface="+mn-lt"/>
+                <a:ea typeface="+mn-ea"/>
+                <a:cs typeface="+mn-cs"/>
+              </a:defRPr>
+            </a:lvl6pPr>
+            <a:lvl7pPr marL="2743200" indent="0" algn="ctr" defTabSz="914400" rtl="0" eaLnBrk="1" latinLnBrk="0" hangingPunct="1">
+              <a:lnSpc>
+                <a:spcPct val="90000"/>
+              </a:lnSpc>
+              <a:spcBef>
+                <a:spcPts val="500"/>
+              </a:spcBef>
+              <a:buFont typeface="Arial" panose="020B0604020202020204" pitchFamily="34" charset="0"/>
+              <a:buNone/>
+              <a:defRPr sz="1600" kern="1200">
+                <a:solidFill>
+                  <a:schemeClr val="tx1"/>
+                </a:solidFill>
+                <a:latin typeface="+mn-lt"/>
+                <a:ea typeface="+mn-ea"/>
+                <a:cs typeface="+mn-cs"/>
+              </a:defRPr>
+            </a:lvl7pPr>
+            <a:lvl8pPr marL="3200400" indent="0" algn="ctr" defTabSz="914400" rtl="0" eaLnBrk="1" latinLnBrk="0" hangingPunct="1">
+              <a:lnSpc>
+                <a:spcPct val="90000"/>
+              </a:lnSpc>
+              <a:spcBef>
+                <a:spcPts val="500"/>
+              </a:spcBef>
+              <a:buFont typeface="Arial" panose="020B0604020202020204" pitchFamily="34" charset="0"/>
+              <a:buNone/>
+              <a:defRPr sz="1600" kern="1200">
+                <a:solidFill>
+                  <a:schemeClr val="tx1"/>
+                </a:solidFill>
+                <a:latin typeface="+mn-lt"/>
+                <a:ea typeface="+mn-ea"/>
+                <a:cs typeface="+mn-cs"/>
+              </a:defRPr>
+            </a:lvl8pPr>
+            <a:lvl9pPr marL="3657600" indent="0" algn="ctr" defTabSz="914400" rtl="0" eaLnBrk="1" latinLnBrk="0" hangingPunct="1">
+              <a:lnSpc>
+                <a:spcPct val="90000"/>
+              </a:lnSpc>
+              <a:spcBef>
+                <a:spcPts val="500"/>
+              </a:spcBef>
+              <a:buFont typeface="Arial" panose="020B0604020202020204" pitchFamily="34" charset="0"/>
+              <a:buNone/>
+              <a:defRPr sz="1600" kern="1200">
+                <a:solidFill>
+                  <a:schemeClr val="tx1"/>
+                </a:solidFill>
+                <a:latin typeface="+mn-lt"/>
+                <a:ea typeface="+mn-ea"/>
+                <a:cs typeface="+mn-cs"/>
+              </a:defRPr>
+            </a:lvl9pPr>
+          </a:lstStyle>
+          <a:p>
+            <a:r>
+              <a:rPr lang="en-US" sz="2000" dirty="0">
+                <a:latin typeface="Calibri"/>
+                <a:ea typeface="Calibri"/>
+                <a:cs typeface="Calibri"/>
+              </a:rPr>
+              <a:t>Input Frame + Mask </a:t>
+            </a:r>
+            <a:r>
+              <a:rPr lang="en-US" sz="2000" dirty="0" err="1">
+                <a:latin typeface="Calibri"/>
+                <a:ea typeface="Calibri"/>
+                <a:cs typeface="Calibri"/>
+              </a:rPr>
+              <a:t>bbox</a:t>
+            </a:r>
+            <a:r>
+              <a:rPr lang="en-US" sz="2000" dirty="0">
+                <a:latin typeface="Calibri"/>
+                <a:ea typeface="Calibri"/>
+                <a:cs typeface="Calibri"/>
+              </a:rPr>
+              <a:t> vehicle</a:t>
+            </a:r>
+          </a:p>
+        </p:txBody>
+      </p:sp>
+      <p:sp>
+        <p:nvSpPr>
+          <p:cNvPr id="10" name="Rectangle 9">
+            <a:extLst>
+              <a:ext uri="{FF2B5EF4-FFF2-40B4-BE49-F238E27FC236}">
+                <a16:creationId xmlns:a16="http://schemas.microsoft.com/office/drawing/2014/main" id="{AA4EE7C8-D510-FFDE-CE81-C138C4E5EA49}"/>
+              </a:ext>
+            </a:extLst>
+          </p:cNvPr>
+          <p:cNvSpPr/>
+          <p:nvPr/>
+        </p:nvSpPr>
+        <p:spPr>
+          <a:xfrm>
+            <a:off x="3664217" y="1916088"/>
+            <a:ext cx="1433591" cy="983935"/>
+          </a:xfrm>
+          <a:prstGeom prst="rect">
+            <a:avLst/>
+          </a:prstGeom>
+        </p:spPr>
+        <p:style>
+          <a:lnRef idx="2">
+            <a:schemeClr val="accent1">
+              <a:shade val="15000"/>
+            </a:schemeClr>
+          </a:lnRef>
+          <a:fillRef idx="1">
+            <a:schemeClr val="accent1"/>
+          </a:fillRef>
+          <a:effectRef idx="0">
+            <a:schemeClr val="accent1"/>
+          </a:effectRef>
+          <a:fontRef idx="minor">
+            <a:schemeClr val="lt1"/>
+          </a:fontRef>
+        </p:style>
+        <p:txBody>
+          <a:bodyPr lIns="91440" tIns="45720" rIns="91440" bIns="45720" rtlCol="0" anchor="ctr"/>
+          <a:lstStyle/>
+          <a:p>
+            <a:pPr algn="ctr"/>
+            <a:r>
+              <a:rPr lang="en-US" dirty="0">
+                <a:latin typeface="Calibri"/>
+                <a:ea typeface="Calibri"/>
+                <a:cs typeface="Calibri"/>
+              </a:rPr>
+              <a:t>CNN probabilistic regression</a:t>
+            </a:r>
+          </a:p>
+        </p:txBody>
+      </p:sp>
+      <p:sp>
+        <p:nvSpPr>
+          <p:cNvPr id="11" name="Subtitle 2">
+            <a:extLst>
+              <a:ext uri="{FF2B5EF4-FFF2-40B4-BE49-F238E27FC236}">
+                <a16:creationId xmlns:a16="http://schemas.microsoft.com/office/drawing/2014/main" id="{551CCDD0-5FD8-3761-2C62-D12D535F4A3F}"/>
+              </a:ext>
+            </a:extLst>
+          </p:cNvPr>
+          <p:cNvSpPr txBox="1">
+            <a:spLocks/>
+          </p:cNvSpPr>
+          <p:nvPr/>
+        </p:nvSpPr>
+        <p:spPr>
+          <a:xfrm>
+            <a:off x="3292869" y="3073658"/>
+            <a:ext cx="2186247" cy="994874"/>
+          </a:xfrm>
+          <a:prstGeom prst="rect">
+            <a:avLst/>
+          </a:prstGeom>
+        </p:spPr>
+        <p:txBody>
+          <a:bodyPr vert="horz" lIns="91440" tIns="45720" rIns="91440" bIns="45720" rtlCol="0" anchor="ctr">
+            <a:normAutofit/>
+          </a:bodyPr>
+          <a:lstStyle>
+            <a:lvl1pPr marL="0" indent="0" algn="ctr" defTabSz="914400" rtl="0" eaLnBrk="1" latinLnBrk="0" hangingPunct="1">
+              <a:lnSpc>
+                <a:spcPct val="90000"/>
+              </a:lnSpc>
+              <a:spcBef>
+                <a:spcPts val="1000"/>
+              </a:spcBef>
+              <a:buFont typeface="Arial" panose="020B0604020202020204" pitchFamily="34" charset="0"/>
+              <a:buNone/>
+              <a:defRPr sz="2400" kern="1200">
+                <a:solidFill>
+                  <a:schemeClr val="tx1"/>
+                </a:solidFill>
+                <a:latin typeface="+mn-lt"/>
+                <a:ea typeface="+mn-ea"/>
+                <a:cs typeface="+mn-cs"/>
+              </a:defRPr>
+            </a:lvl1pPr>
+            <a:lvl2pPr marL="457200" indent="0" algn="ctr" defTabSz="914400" rtl="0" eaLnBrk="1" latinLnBrk="0" hangingPunct="1">
+              <a:lnSpc>
+                <a:spcPct val="90000"/>
+              </a:lnSpc>
+              <a:spcBef>
+                <a:spcPts val="500"/>
+              </a:spcBef>
+              <a:buFont typeface="Arial" panose="020B0604020202020204" pitchFamily="34" charset="0"/>
+              <a:buNone/>
+              <a:defRPr sz="2000" kern="1200">
+                <a:solidFill>
+                  <a:schemeClr val="tx1"/>
+                </a:solidFill>
+                <a:latin typeface="+mn-lt"/>
+                <a:ea typeface="+mn-ea"/>
+                <a:cs typeface="+mn-cs"/>
+              </a:defRPr>
+            </a:lvl2pPr>
+            <a:lvl3pPr marL="914400" indent="0" algn="ctr" defTabSz="914400" rtl="0" eaLnBrk="1" latinLnBrk="0" hangingPunct="1">
+              <a:lnSpc>
+                <a:spcPct val="90000"/>
+              </a:lnSpc>
+              <a:spcBef>
+                <a:spcPts val="500"/>
+              </a:spcBef>
+              <a:buFont typeface="Arial" panose="020B0604020202020204" pitchFamily="34" charset="0"/>
+              <a:buNone/>
+              <a:defRPr sz="1800" kern="1200">
+                <a:solidFill>
+                  <a:schemeClr val="tx1"/>
+                </a:solidFill>
+                <a:latin typeface="+mn-lt"/>
+                <a:ea typeface="+mn-ea"/>
+                <a:cs typeface="+mn-cs"/>
+              </a:defRPr>
+            </a:lvl3pPr>
+            <a:lvl4pPr marL="1371600" indent="0" algn="ctr" defTabSz="914400" rtl="0" eaLnBrk="1" latinLnBrk="0" hangingPunct="1">
+              <a:lnSpc>
+                <a:spcPct val="90000"/>
+              </a:lnSpc>
+              <a:spcBef>
+                <a:spcPts val="500"/>
+              </a:spcBef>
+              <a:buFont typeface="Arial" panose="020B0604020202020204" pitchFamily="34" charset="0"/>
+              <a:buNone/>
+              <a:defRPr sz="1600" kern="1200">
+                <a:solidFill>
+                  <a:schemeClr val="tx1"/>
+                </a:solidFill>
+                <a:latin typeface="+mn-lt"/>
+                <a:ea typeface="+mn-ea"/>
+                <a:cs typeface="+mn-cs"/>
+              </a:defRPr>
+            </a:lvl4pPr>
+            <a:lvl5pPr marL="1828800" indent="0" algn="ctr" defTabSz="914400" rtl="0" eaLnBrk="1" latinLnBrk="0" hangingPunct="1">
+              <a:lnSpc>
+                <a:spcPct val="90000"/>
+              </a:lnSpc>
+              <a:spcBef>
+                <a:spcPts val="500"/>
+              </a:spcBef>
+              <a:buFont typeface="Arial" panose="020B0604020202020204" pitchFamily="34" charset="0"/>
+              <a:buNone/>
+              <a:defRPr sz="1600" kern="1200">
+                <a:solidFill>
+                  <a:schemeClr val="tx1"/>
+                </a:solidFill>
+                <a:latin typeface="+mn-lt"/>
+                <a:ea typeface="+mn-ea"/>
+                <a:cs typeface="+mn-cs"/>
+              </a:defRPr>
+            </a:lvl5pPr>
+            <a:lvl6pPr marL="2286000" indent="0" algn="ctr" defTabSz="914400" rtl="0" eaLnBrk="1" latinLnBrk="0" hangingPunct="1">
+              <a:lnSpc>
+                <a:spcPct val="90000"/>
+              </a:lnSpc>
+              <a:spcBef>
+                <a:spcPts val="500"/>
+              </a:spcBef>
+              <a:buFont typeface="Arial" panose="020B0604020202020204" pitchFamily="34" charset="0"/>
+              <a:buNone/>
+              <a:defRPr sz="1600" kern="1200">
+                <a:solidFill>
+                  <a:schemeClr val="tx1"/>
+                </a:solidFill>
+                <a:latin typeface="+mn-lt"/>
+                <a:ea typeface="+mn-ea"/>
+                <a:cs typeface="+mn-cs"/>
+              </a:defRPr>
+            </a:lvl6pPr>
+            <a:lvl7pPr marL="2743200" indent="0" algn="ctr" defTabSz="914400" rtl="0" eaLnBrk="1" latinLnBrk="0" hangingPunct="1">
+              <a:lnSpc>
+                <a:spcPct val="90000"/>
+              </a:lnSpc>
+              <a:spcBef>
+                <a:spcPts val="500"/>
+              </a:spcBef>
+              <a:buFont typeface="Arial" panose="020B0604020202020204" pitchFamily="34" charset="0"/>
+              <a:buNone/>
+              <a:defRPr sz="1600" kern="1200">
+                <a:solidFill>
+                  <a:schemeClr val="tx1"/>
+                </a:solidFill>
+                <a:latin typeface="+mn-lt"/>
+                <a:ea typeface="+mn-ea"/>
+                <a:cs typeface="+mn-cs"/>
+              </a:defRPr>
+            </a:lvl7pPr>
+            <a:lvl8pPr marL="3200400" indent="0" algn="ctr" defTabSz="914400" rtl="0" eaLnBrk="1" latinLnBrk="0" hangingPunct="1">
+              <a:lnSpc>
+                <a:spcPct val="90000"/>
+              </a:lnSpc>
+              <a:spcBef>
+                <a:spcPts val="500"/>
+              </a:spcBef>
+              <a:buFont typeface="Arial" panose="020B0604020202020204" pitchFamily="34" charset="0"/>
+              <a:buNone/>
+              <a:defRPr sz="1600" kern="1200">
+                <a:solidFill>
+                  <a:schemeClr val="tx1"/>
+                </a:solidFill>
+                <a:latin typeface="+mn-lt"/>
+                <a:ea typeface="+mn-ea"/>
+                <a:cs typeface="+mn-cs"/>
+              </a:defRPr>
+            </a:lvl8pPr>
+            <a:lvl9pPr marL="3657600" indent="0" algn="ctr" defTabSz="914400" rtl="0" eaLnBrk="1" latinLnBrk="0" hangingPunct="1">
+              <a:lnSpc>
+                <a:spcPct val="90000"/>
+              </a:lnSpc>
+              <a:spcBef>
+                <a:spcPts val="500"/>
+              </a:spcBef>
+              <a:buFont typeface="Arial" panose="020B0604020202020204" pitchFamily="34" charset="0"/>
+              <a:buNone/>
+              <a:defRPr sz="1600" kern="1200">
+                <a:solidFill>
+                  <a:schemeClr val="tx1"/>
+                </a:solidFill>
+                <a:latin typeface="+mn-lt"/>
+                <a:ea typeface="+mn-ea"/>
+                <a:cs typeface="+mn-cs"/>
+              </a:defRPr>
+            </a:lvl9pPr>
+          </a:lstStyle>
+          <a:p>
+            <a:r>
+              <a:rPr lang="en-US" sz="2000" dirty="0">
+                <a:latin typeface="Calibri"/>
+                <a:ea typeface="Calibri"/>
+                <a:cs typeface="Calibri"/>
+              </a:rPr>
+              <a:t>Forecasts the vehicles position 1 second later</a:t>
+            </a:r>
+          </a:p>
+        </p:txBody>
+      </p:sp>
+      <p:sp>
+        <p:nvSpPr>
+          <p:cNvPr id="12" name="Subtitle 2">
+            <a:extLst>
+              <a:ext uri="{FF2B5EF4-FFF2-40B4-BE49-F238E27FC236}">
+                <a16:creationId xmlns:a16="http://schemas.microsoft.com/office/drawing/2014/main" id="{8B0A2DCC-0ACF-65D0-334D-BF1D691AEFDD}"/>
+              </a:ext>
+            </a:extLst>
+          </p:cNvPr>
+          <p:cNvSpPr txBox="1">
+            <a:spLocks/>
+          </p:cNvSpPr>
+          <p:nvPr/>
+        </p:nvSpPr>
+        <p:spPr>
+          <a:xfrm>
+            <a:off x="6467471" y="1437380"/>
+            <a:ext cx="1795221" cy="583796"/>
+          </a:xfrm>
+          <a:prstGeom prst="rect">
+            <a:avLst/>
+          </a:prstGeom>
+        </p:spPr>
+        <p:txBody>
+          <a:bodyPr vert="horz" lIns="91440" tIns="45720" rIns="91440" bIns="45720" rtlCol="0" anchor="ctr">
+            <a:normAutofit/>
+          </a:bodyPr>
+          <a:lstStyle>
+            <a:lvl1pPr marL="0" indent="0" algn="ctr" defTabSz="914400" rtl="0" eaLnBrk="1" latinLnBrk="0" hangingPunct="1">
+              <a:lnSpc>
+                <a:spcPct val="90000"/>
+              </a:lnSpc>
+              <a:spcBef>
+                <a:spcPts val="1000"/>
+              </a:spcBef>
+              <a:buFont typeface="Arial" panose="020B0604020202020204" pitchFamily="34" charset="0"/>
+              <a:buNone/>
+              <a:defRPr sz="2400" kern="1200">
+                <a:solidFill>
+                  <a:schemeClr val="tx1"/>
+                </a:solidFill>
+                <a:latin typeface="+mn-lt"/>
+                <a:ea typeface="+mn-ea"/>
+                <a:cs typeface="+mn-cs"/>
+              </a:defRPr>
+            </a:lvl1pPr>
+            <a:lvl2pPr marL="457200" indent="0" algn="ctr" defTabSz="914400" rtl="0" eaLnBrk="1" latinLnBrk="0" hangingPunct="1">
+              <a:lnSpc>
+                <a:spcPct val="90000"/>
+              </a:lnSpc>
+              <a:spcBef>
+                <a:spcPts val="500"/>
+              </a:spcBef>
+              <a:buFont typeface="Arial" panose="020B0604020202020204" pitchFamily="34" charset="0"/>
+              <a:buNone/>
+              <a:defRPr sz="2000" kern="1200">
+                <a:solidFill>
+                  <a:schemeClr val="tx1"/>
+                </a:solidFill>
+                <a:latin typeface="+mn-lt"/>
+                <a:ea typeface="+mn-ea"/>
+                <a:cs typeface="+mn-cs"/>
+              </a:defRPr>
+            </a:lvl2pPr>
+            <a:lvl3pPr marL="914400" indent="0" algn="ctr" defTabSz="914400" rtl="0" eaLnBrk="1" latinLnBrk="0" hangingPunct="1">
+              <a:lnSpc>
+                <a:spcPct val="90000"/>
+              </a:lnSpc>
+              <a:spcBef>
+                <a:spcPts val="500"/>
+              </a:spcBef>
+              <a:buFont typeface="Arial" panose="020B0604020202020204" pitchFamily="34" charset="0"/>
+              <a:buNone/>
+              <a:defRPr sz="1800" kern="1200">
+                <a:solidFill>
+                  <a:schemeClr val="tx1"/>
+                </a:solidFill>
+                <a:latin typeface="+mn-lt"/>
+                <a:ea typeface="+mn-ea"/>
+                <a:cs typeface="+mn-cs"/>
+              </a:defRPr>
+            </a:lvl3pPr>
+            <a:lvl4pPr marL="1371600" indent="0" algn="ctr" defTabSz="914400" rtl="0" eaLnBrk="1" latinLnBrk="0" hangingPunct="1">
+              <a:lnSpc>
+                <a:spcPct val="90000"/>
+              </a:lnSpc>
+              <a:spcBef>
+                <a:spcPts val="500"/>
+              </a:spcBef>
+              <a:buFont typeface="Arial" panose="020B0604020202020204" pitchFamily="34" charset="0"/>
+              <a:buNone/>
+              <a:defRPr sz="1600" kern="1200">
+                <a:solidFill>
+                  <a:schemeClr val="tx1"/>
+                </a:solidFill>
+                <a:latin typeface="+mn-lt"/>
+                <a:ea typeface="+mn-ea"/>
+                <a:cs typeface="+mn-cs"/>
+              </a:defRPr>
+            </a:lvl4pPr>
+            <a:lvl5pPr marL="1828800" indent="0" algn="ctr" defTabSz="914400" rtl="0" eaLnBrk="1" latinLnBrk="0" hangingPunct="1">
+              <a:lnSpc>
+                <a:spcPct val="90000"/>
+              </a:lnSpc>
+              <a:spcBef>
+                <a:spcPts val="500"/>
+              </a:spcBef>
+              <a:buFont typeface="Arial" panose="020B0604020202020204" pitchFamily="34" charset="0"/>
+              <a:buNone/>
+              <a:defRPr sz="1600" kern="1200">
+                <a:solidFill>
+                  <a:schemeClr val="tx1"/>
+                </a:solidFill>
+                <a:latin typeface="+mn-lt"/>
+                <a:ea typeface="+mn-ea"/>
+                <a:cs typeface="+mn-cs"/>
+              </a:defRPr>
+            </a:lvl5pPr>
+            <a:lvl6pPr marL="2286000" indent="0" algn="ctr" defTabSz="914400" rtl="0" eaLnBrk="1" latinLnBrk="0" hangingPunct="1">
+              <a:lnSpc>
+                <a:spcPct val="90000"/>
+              </a:lnSpc>
+              <a:spcBef>
+                <a:spcPts val="500"/>
+              </a:spcBef>
+              <a:buFont typeface="Arial" panose="020B0604020202020204" pitchFamily="34" charset="0"/>
+              <a:buNone/>
+              <a:defRPr sz="1600" kern="1200">
+                <a:solidFill>
+                  <a:schemeClr val="tx1"/>
+                </a:solidFill>
+                <a:latin typeface="+mn-lt"/>
+                <a:ea typeface="+mn-ea"/>
+                <a:cs typeface="+mn-cs"/>
+              </a:defRPr>
+            </a:lvl6pPr>
+            <a:lvl7pPr marL="2743200" indent="0" algn="ctr" defTabSz="914400" rtl="0" eaLnBrk="1" latinLnBrk="0" hangingPunct="1">
+              <a:lnSpc>
+                <a:spcPct val="90000"/>
+              </a:lnSpc>
+              <a:spcBef>
+                <a:spcPts val="500"/>
+              </a:spcBef>
+              <a:buFont typeface="Arial" panose="020B0604020202020204" pitchFamily="34" charset="0"/>
+              <a:buNone/>
+              <a:defRPr sz="1600" kern="1200">
+                <a:solidFill>
+                  <a:schemeClr val="tx1"/>
+                </a:solidFill>
+                <a:latin typeface="+mn-lt"/>
+                <a:ea typeface="+mn-ea"/>
+                <a:cs typeface="+mn-cs"/>
+              </a:defRPr>
+            </a:lvl7pPr>
+            <a:lvl8pPr marL="3200400" indent="0" algn="ctr" defTabSz="914400" rtl="0" eaLnBrk="1" latinLnBrk="0" hangingPunct="1">
+              <a:lnSpc>
+                <a:spcPct val="90000"/>
+              </a:lnSpc>
+              <a:spcBef>
+                <a:spcPts val="500"/>
+              </a:spcBef>
+              <a:buFont typeface="Arial" panose="020B0604020202020204" pitchFamily="34" charset="0"/>
+              <a:buNone/>
+              <a:defRPr sz="1600" kern="1200">
+                <a:solidFill>
+                  <a:schemeClr val="tx1"/>
+                </a:solidFill>
+                <a:latin typeface="+mn-lt"/>
+                <a:ea typeface="+mn-ea"/>
+                <a:cs typeface="+mn-cs"/>
+              </a:defRPr>
+            </a:lvl8pPr>
+            <a:lvl9pPr marL="3657600" indent="0" algn="ctr" defTabSz="914400" rtl="0" eaLnBrk="1" latinLnBrk="0" hangingPunct="1">
+              <a:lnSpc>
+                <a:spcPct val="90000"/>
+              </a:lnSpc>
+              <a:spcBef>
+                <a:spcPts val="500"/>
+              </a:spcBef>
+              <a:buFont typeface="Arial" panose="020B0604020202020204" pitchFamily="34" charset="0"/>
+              <a:buNone/>
+              <a:defRPr sz="1600" kern="1200">
+                <a:solidFill>
+                  <a:schemeClr val="tx1"/>
+                </a:solidFill>
+                <a:latin typeface="+mn-lt"/>
+                <a:ea typeface="+mn-ea"/>
+                <a:cs typeface="+mn-cs"/>
+              </a:defRPr>
+            </a:lvl9pPr>
+          </a:lstStyle>
+          <a:p>
+            <a:r>
+              <a:rPr lang="en-US" sz="2000" dirty="0">
+                <a:latin typeface="Calibri"/>
+                <a:ea typeface="Calibri"/>
+                <a:cs typeface="Calibri"/>
+              </a:rPr>
+              <a:t>Prediction</a:t>
+            </a:r>
+          </a:p>
+        </p:txBody>
+      </p:sp>
+      <p:sp>
+        <p:nvSpPr>
+          <p:cNvPr id="13" name="Subtitle 2">
+            <a:extLst>
+              <a:ext uri="{FF2B5EF4-FFF2-40B4-BE49-F238E27FC236}">
+                <a16:creationId xmlns:a16="http://schemas.microsoft.com/office/drawing/2014/main" id="{C440579B-8870-7EC3-E453-A9F426607CC8}"/>
+              </a:ext>
+            </a:extLst>
+          </p:cNvPr>
+          <p:cNvSpPr txBox="1">
+            <a:spLocks/>
+          </p:cNvSpPr>
+          <p:nvPr/>
+        </p:nvSpPr>
+        <p:spPr>
+          <a:xfrm>
+            <a:off x="6730703" y="3582839"/>
+            <a:ext cx="1795221" cy="583796"/>
+          </a:xfrm>
+          <a:prstGeom prst="rect">
+            <a:avLst/>
+          </a:prstGeom>
+        </p:spPr>
+        <p:txBody>
+          <a:bodyPr vert="horz" lIns="91440" tIns="45720" rIns="91440" bIns="45720" rtlCol="0" anchor="ctr">
+            <a:normAutofit/>
+          </a:bodyPr>
+          <a:lstStyle>
+            <a:lvl1pPr marL="0" indent="0" algn="ctr" defTabSz="914400" rtl="0" eaLnBrk="1" latinLnBrk="0" hangingPunct="1">
+              <a:lnSpc>
+                <a:spcPct val="90000"/>
+              </a:lnSpc>
+              <a:spcBef>
+                <a:spcPts val="1000"/>
+              </a:spcBef>
+              <a:buFont typeface="Arial" panose="020B0604020202020204" pitchFamily="34" charset="0"/>
+              <a:buNone/>
+              <a:defRPr sz="2400" kern="1200">
+                <a:solidFill>
+                  <a:schemeClr val="tx1"/>
+                </a:solidFill>
+                <a:latin typeface="+mn-lt"/>
+                <a:ea typeface="+mn-ea"/>
+                <a:cs typeface="+mn-cs"/>
+              </a:defRPr>
+            </a:lvl1pPr>
+            <a:lvl2pPr marL="457200" indent="0" algn="ctr" defTabSz="914400" rtl="0" eaLnBrk="1" latinLnBrk="0" hangingPunct="1">
+              <a:lnSpc>
+                <a:spcPct val="90000"/>
+              </a:lnSpc>
+              <a:spcBef>
+                <a:spcPts val="500"/>
+              </a:spcBef>
+              <a:buFont typeface="Arial" panose="020B0604020202020204" pitchFamily="34" charset="0"/>
+              <a:buNone/>
+              <a:defRPr sz="2000" kern="1200">
+                <a:solidFill>
+                  <a:schemeClr val="tx1"/>
+                </a:solidFill>
+                <a:latin typeface="+mn-lt"/>
+                <a:ea typeface="+mn-ea"/>
+                <a:cs typeface="+mn-cs"/>
+              </a:defRPr>
+            </a:lvl2pPr>
+            <a:lvl3pPr marL="914400" indent="0" algn="ctr" defTabSz="914400" rtl="0" eaLnBrk="1" latinLnBrk="0" hangingPunct="1">
+              <a:lnSpc>
+                <a:spcPct val="90000"/>
+              </a:lnSpc>
+              <a:spcBef>
+                <a:spcPts val="500"/>
+              </a:spcBef>
+              <a:buFont typeface="Arial" panose="020B0604020202020204" pitchFamily="34" charset="0"/>
+              <a:buNone/>
+              <a:defRPr sz="1800" kern="1200">
+                <a:solidFill>
+                  <a:schemeClr val="tx1"/>
+                </a:solidFill>
+                <a:latin typeface="+mn-lt"/>
+                <a:ea typeface="+mn-ea"/>
+                <a:cs typeface="+mn-cs"/>
+              </a:defRPr>
+            </a:lvl3pPr>
+            <a:lvl4pPr marL="1371600" indent="0" algn="ctr" defTabSz="914400" rtl="0" eaLnBrk="1" latinLnBrk="0" hangingPunct="1">
+              <a:lnSpc>
+                <a:spcPct val="90000"/>
+              </a:lnSpc>
+              <a:spcBef>
+                <a:spcPts val="500"/>
+              </a:spcBef>
+              <a:buFont typeface="Arial" panose="020B0604020202020204" pitchFamily="34" charset="0"/>
+              <a:buNone/>
+              <a:defRPr sz="1600" kern="1200">
+                <a:solidFill>
+                  <a:schemeClr val="tx1"/>
+                </a:solidFill>
+                <a:latin typeface="+mn-lt"/>
+                <a:ea typeface="+mn-ea"/>
+                <a:cs typeface="+mn-cs"/>
+              </a:defRPr>
+            </a:lvl4pPr>
+            <a:lvl5pPr marL="1828800" indent="0" algn="ctr" defTabSz="914400" rtl="0" eaLnBrk="1" latinLnBrk="0" hangingPunct="1">
+              <a:lnSpc>
+                <a:spcPct val="90000"/>
+              </a:lnSpc>
+              <a:spcBef>
+                <a:spcPts val="500"/>
+              </a:spcBef>
+              <a:buFont typeface="Arial" panose="020B0604020202020204" pitchFamily="34" charset="0"/>
+              <a:buNone/>
+              <a:defRPr sz="1600" kern="1200">
+                <a:solidFill>
+                  <a:schemeClr val="tx1"/>
+                </a:solidFill>
+                <a:latin typeface="+mn-lt"/>
+                <a:ea typeface="+mn-ea"/>
+                <a:cs typeface="+mn-cs"/>
+              </a:defRPr>
+            </a:lvl5pPr>
+            <a:lvl6pPr marL="2286000" indent="0" algn="ctr" defTabSz="914400" rtl="0" eaLnBrk="1" latinLnBrk="0" hangingPunct="1">
+              <a:lnSpc>
+                <a:spcPct val="90000"/>
+              </a:lnSpc>
+              <a:spcBef>
+                <a:spcPts val="500"/>
+              </a:spcBef>
+              <a:buFont typeface="Arial" panose="020B0604020202020204" pitchFamily="34" charset="0"/>
+              <a:buNone/>
+              <a:defRPr sz="1600" kern="1200">
+                <a:solidFill>
+                  <a:schemeClr val="tx1"/>
+                </a:solidFill>
+                <a:latin typeface="+mn-lt"/>
+                <a:ea typeface="+mn-ea"/>
+                <a:cs typeface="+mn-cs"/>
+              </a:defRPr>
+            </a:lvl6pPr>
+            <a:lvl7pPr marL="2743200" indent="0" algn="ctr" defTabSz="914400" rtl="0" eaLnBrk="1" latinLnBrk="0" hangingPunct="1">
+              <a:lnSpc>
+                <a:spcPct val="90000"/>
+              </a:lnSpc>
+              <a:spcBef>
+                <a:spcPts val="500"/>
+              </a:spcBef>
+              <a:buFont typeface="Arial" panose="020B0604020202020204" pitchFamily="34" charset="0"/>
+              <a:buNone/>
+              <a:defRPr sz="1600" kern="1200">
+                <a:solidFill>
+                  <a:schemeClr val="tx1"/>
+                </a:solidFill>
+                <a:latin typeface="+mn-lt"/>
+                <a:ea typeface="+mn-ea"/>
+                <a:cs typeface="+mn-cs"/>
+              </a:defRPr>
+            </a:lvl7pPr>
+            <a:lvl8pPr marL="3200400" indent="0" algn="ctr" defTabSz="914400" rtl="0" eaLnBrk="1" latinLnBrk="0" hangingPunct="1">
+              <a:lnSpc>
+                <a:spcPct val="90000"/>
+              </a:lnSpc>
+              <a:spcBef>
+                <a:spcPts val="500"/>
+              </a:spcBef>
+              <a:buFont typeface="Arial" panose="020B0604020202020204" pitchFamily="34" charset="0"/>
+              <a:buNone/>
+              <a:defRPr sz="1600" kern="1200">
+                <a:solidFill>
+                  <a:schemeClr val="tx1"/>
+                </a:solidFill>
+                <a:latin typeface="+mn-lt"/>
+                <a:ea typeface="+mn-ea"/>
+                <a:cs typeface="+mn-cs"/>
+              </a:defRPr>
+            </a:lvl8pPr>
+            <a:lvl9pPr marL="3657600" indent="0" algn="ctr" defTabSz="914400" rtl="0" eaLnBrk="1" latinLnBrk="0" hangingPunct="1">
+              <a:lnSpc>
+                <a:spcPct val="90000"/>
+              </a:lnSpc>
+              <a:spcBef>
+                <a:spcPts val="500"/>
+              </a:spcBef>
+              <a:buFont typeface="Arial" panose="020B0604020202020204" pitchFamily="34" charset="0"/>
+              <a:buNone/>
+              <a:defRPr sz="1600" kern="1200">
+                <a:solidFill>
+                  <a:schemeClr val="tx1"/>
+                </a:solidFill>
+                <a:latin typeface="+mn-lt"/>
+                <a:ea typeface="+mn-ea"/>
+                <a:cs typeface="+mn-cs"/>
+              </a:defRPr>
+            </a:lvl9pPr>
+          </a:lstStyle>
+          <a:p>
+            <a:r>
+              <a:rPr lang="en-US" sz="2000" dirty="0">
+                <a:latin typeface="Calibri"/>
+                <a:ea typeface="Calibri"/>
+                <a:cs typeface="Calibri"/>
+              </a:rPr>
+              <a:t>Target position</a:t>
+            </a:r>
+          </a:p>
+        </p:txBody>
+      </p:sp>
+      <p:pic>
+        <p:nvPicPr>
+          <p:cNvPr id="15" name="Picture 14">
+            <a:extLst>
+              <a:ext uri="{FF2B5EF4-FFF2-40B4-BE49-F238E27FC236}">
+                <a16:creationId xmlns:a16="http://schemas.microsoft.com/office/drawing/2014/main" id="{1C413BF0-BDE3-56C2-F679-D1AB5530AEFB}"/>
+              </a:ext>
+            </a:extLst>
+          </p:cNvPr>
+          <p:cNvPicPr>
+            <a:picLocks noChangeAspect="1"/>
+          </p:cNvPicPr>
+          <p:nvPr/>
+        </p:nvPicPr>
+        <p:blipFill>
+          <a:blip r:embed="rId2"/>
+          <a:stretch>
+            <a:fillRect/>
+          </a:stretch>
+        </p:blipFill>
+        <p:spPr>
+          <a:xfrm>
+            <a:off x="585139" y="1790482"/>
+            <a:ext cx="1883206" cy="1242288"/>
+          </a:xfrm>
+          <a:prstGeom prst="rect">
+            <a:avLst/>
+          </a:prstGeom>
+        </p:spPr>
+      </p:pic>
+      <p:sp>
+        <p:nvSpPr>
+          <p:cNvPr id="17" name="Subtitle 2">
+            <a:extLst>
+              <a:ext uri="{FF2B5EF4-FFF2-40B4-BE49-F238E27FC236}">
+                <a16:creationId xmlns:a16="http://schemas.microsoft.com/office/drawing/2014/main" id="{7BF764B5-1523-DDF4-D13D-B8F33D2C8C53}"/>
+              </a:ext>
+            </a:extLst>
+          </p:cNvPr>
+          <p:cNvSpPr txBox="1">
+            <a:spLocks/>
+          </p:cNvSpPr>
+          <p:nvPr/>
+        </p:nvSpPr>
+        <p:spPr>
+          <a:xfrm>
+            <a:off x="5598921" y="1437380"/>
+            <a:ext cx="1795221" cy="583796"/>
+          </a:xfrm>
+          <a:prstGeom prst="rect">
+            <a:avLst/>
+          </a:prstGeom>
+        </p:spPr>
+        <p:txBody>
+          <a:bodyPr vert="horz" lIns="91440" tIns="45720" rIns="91440" bIns="45720" rtlCol="0" anchor="ctr">
+            <a:normAutofit/>
+          </a:bodyPr>
+          <a:lstStyle>
+            <a:lvl1pPr marL="0" indent="0" algn="ctr" defTabSz="914400" rtl="0" eaLnBrk="1" latinLnBrk="0" hangingPunct="1">
+              <a:lnSpc>
+                <a:spcPct val="90000"/>
+              </a:lnSpc>
+              <a:spcBef>
+                <a:spcPts val="1000"/>
+              </a:spcBef>
+              <a:buFont typeface="Arial" panose="020B0604020202020204" pitchFamily="34" charset="0"/>
+              <a:buNone/>
+              <a:defRPr sz="2400" kern="1200">
+                <a:solidFill>
+                  <a:schemeClr val="tx1"/>
+                </a:solidFill>
+                <a:latin typeface="+mn-lt"/>
+                <a:ea typeface="+mn-ea"/>
+                <a:cs typeface="+mn-cs"/>
+              </a:defRPr>
+            </a:lvl1pPr>
+            <a:lvl2pPr marL="457200" indent="0" algn="ctr" defTabSz="914400" rtl="0" eaLnBrk="1" latinLnBrk="0" hangingPunct="1">
+              <a:lnSpc>
+                <a:spcPct val="90000"/>
+              </a:lnSpc>
+              <a:spcBef>
+                <a:spcPts val="500"/>
+              </a:spcBef>
+              <a:buFont typeface="Arial" panose="020B0604020202020204" pitchFamily="34" charset="0"/>
+              <a:buNone/>
+              <a:defRPr sz="2000" kern="1200">
+                <a:solidFill>
+                  <a:schemeClr val="tx1"/>
+                </a:solidFill>
+                <a:latin typeface="+mn-lt"/>
+                <a:ea typeface="+mn-ea"/>
+                <a:cs typeface="+mn-cs"/>
+              </a:defRPr>
+            </a:lvl2pPr>
+            <a:lvl3pPr marL="914400" indent="0" algn="ctr" defTabSz="914400" rtl="0" eaLnBrk="1" latinLnBrk="0" hangingPunct="1">
+              <a:lnSpc>
+                <a:spcPct val="90000"/>
+              </a:lnSpc>
+              <a:spcBef>
+                <a:spcPts val="500"/>
+              </a:spcBef>
+              <a:buFont typeface="Arial" panose="020B0604020202020204" pitchFamily="34" charset="0"/>
+              <a:buNone/>
+              <a:defRPr sz="1800" kern="1200">
+                <a:solidFill>
+                  <a:schemeClr val="tx1"/>
+                </a:solidFill>
+                <a:latin typeface="+mn-lt"/>
+                <a:ea typeface="+mn-ea"/>
+                <a:cs typeface="+mn-cs"/>
+              </a:defRPr>
+            </a:lvl3pPr>
+            <a:lvl4pPr marL="1371600" indent="0" algn="ctr" defTabSz="914400" rtl="0" eaLnBrk="1" latinLnBrk="0" hangingPunct="1">
+              <a:lnSpc>
+                <a:spcPct val="90000"/>
+              </a:lnSpc>
+              <a:spcBef>
+                <a:spcPts val="500"/>
+              </a:spcBef>
+              <a:buFont typeface="Arial" panose="020B0604020202020204" pitchFamily="34" charset="0"/>
+              <a:buNone/>
+              <a:defRPr sz="1600" kern="1200">
+                <a:solidFill>
+                  <a:schemeClr val="tx1"/>
+                </a:solidFill>
+                <a:latin typeface="+mn-lt"/>
+                <a:ea typeface="+mn-ea"/>
+                <a:cs typeface="+mn-cs"/>
+              </a:defRPr>
+            </a:lvl4pPr>
+            <a:lvl5pPr marL="1828800" indent="0" algn="ctr" defTabSz="914400" rtl="0" eaLnBrk="1" latinLnBrk="0" hangingPunct="1">
+              <a:lnSpc>
+                <a:spcPct val="90000"/>
+              </a:lnSpc>
+              <a:spcBef>
+                <a:spcPts val="500"/>
+              </a:spcBef>
+              <a:buFont typeface="Arial" panose="020B0604020202020204" pitchFamily="34" charset="0"/>
+              <a:buNone/>
+              <a:defRPr sz="1600" kern="1200">
+                <a:solidFill>
+                  <a:schemeClr val="tx1"/>
+                </a:solidFill>
+                <a:latin typeface="+mn-lt"/>
+                <a:ea typeface="+mn-ea"/>
+                <a:cs typeface="+mn-cs"/>
+              </a:defRPr>
+            </a:lvl5pPr>
+            <a:lvl6pPr marL="2286000" indent="0" algn="ctr" defTabSz="914400" rtl="0" eaLnBrk="1" latinLnBrk="0" hangingPunct="1">
+              <a:lnSpc>
+                <a:spcPct val="90000"/>
+              </a:lnSpc>
+              <a:spcBef>
+                <a:spcPts val="500"/>
+              </a:spcBef>
+              <a:buFont typeface="Arial" panose="020B0604020202020204" pitchFamily="34" charset="0"/>
+              <a:buNone/>
+              <a:defRPr sz="1600" kern="1200">
+                <a:solidFill>
+                  <a:schemeClr val="tx1"/>
+                </a:solidFill>
+                <a:latin typeface="+mn-lt"/>
+                <a:ea typeface="+mn-ea"/>
+                <a:cs typeface="+mn-cs"/>
+              </a:defRPr>
+            </a:lvl6pPr>
+            <a:lvl7pPr marL="2743200" indent="0" algn="ctr" defTabSz="914400" rtl="0" eaLnBrk="1" latinLnBrk="0" hangingPunct="1">
+              <a:lnSpc>
+                <a:spcPct val="90000"/>
+              </a:lnSpc>
+              <a:spcBef>
+                <a:spcPts val="500"/>
+              </a:spcBef>
+              <a:buFont typeface="Arial" panose="020B0604020202020204" pitchFamily="34" charset="0"/>
+              <a:buNone/>
+              <a:defRPr sz="1600" kern="1200">
+                <a:solidFill>
+                  <a:schemeClr val="tx1"/>
+                </a:solidFill>
+                <a:latin typeface="+mn-lt"/>
+                <a:ea typeface="+mn-ea"/>
+                <a:cs typeface="+mn-cs"/>
+              </a:defRPr>
+            </a:lvl7pPr>
+            <a:lvl8pPr marL="3200400" indent="0" algn="ctr" defTabSz="914400" rtl="0" eaLnBrk="1" latinLnBrk="0" hangingPunct="1">
+              <a:lnSpc>
+                <a:spcPct val="90000"/>
+              </a:lnSpc>
+              <a:spcBef>
+                <a:spcPts val="500"/>
+              </a:spcBef>
+              <a:buFont typeface="Arial" panose="020B0604020202020204" pitchFamily="34" charset="0"/>
+              <a:buNone/>
+              <a:defRPr sz="1600" kern="1200">
+                <a:solidFill>
+                  <a:schemeClr val="tx1"/>
+                </a:solidFill>
+                <a:latin typeface="+mn-lt"/>
+                <a:ea typeface="+mn-ea"/>
+                <a:cs typeface="+mn-cs"/>
+              </a:defRPr>
+            </a:lvl8pPr>
+            <a:lvl9pPr marL="3657600" indent="0" algn="ctr" defTabSz="914400" rtl="0" eaLnBrk="1" latinLnBrk="0" hangingPunct="1">
+              <a:lnSpc>
+                <a:spcPct val="90000"/>
+              </a:lnSpc>
+              <a:spcBef>
+                <a:spcPts val="500"/>
+              </a:spcBef>
+              <a:buFont typeface="Arial" panose="020B0604020202020204" pitchFamily="34" charset="0"/>
+              <a:buNone/>
+              <a:defRPr sz="1600" kern="1200">
+                <a:solidFill>
+                  <a:schemeClr val="tx1"/>
+                </a:solidFill>
+                <a:latin typeface="+mn-lt"/>
+                <a:ea typeface="+mn-ea"/>
+                <a:cs typeface="+mn-cs"/>
+              </a:defRPr>
+            </a:lvl9pPr>
+          </a:lstStyle>
+          <a:p>
+            <a:r>
+              <a:rPr lang="en-US" sz="2000" dirty="0">
+                <a:latin typeface="Calibri"/>
+                <a:ea typeface="Calibri"/>
+                <a:cs typeface="Calibri"/>
+              </a:rPr>
+              <a:t>µ, Σ</a:t>
+            </a:r>
+            <a:endParaRPr lang="en-US" sz="2000">
+              <a:latin typeface="Calibri"/>
+              <a:ea typeface="Calibri"/>
+              <a:cs typeface="Calibri"/>
+            </a:endParaRPr>
+          </a:p>
+        </p:txBody>
+      </p:sp>
+      <p:sp>
+        <p:nvSpPr>
+          <p:cNvPr id="18" name="Subtitle 2">
+            <a:extLst>
+              <a:ext uri="{FF2B5EF4-FFF2-40B4-BE49-F238E27FC236}">
+                <a16:creationId xmlns:a16="http://schemas.microsoft.com/office/drawing/2014/main" id="{D868E30A-7BE4-0355-1FFF-6D6648CD6DC5}"/>
+              </a:ext>
+            </a:extLst>
+          </p:cNvPr>
+          <p:cNvSpPr txBox="1">
+            <a:spLocks/>
+          </p:cNvSpPr>
+          <p:nvPr/>
+        </p:nvSpPr>
+        <p:spPr>
+          <a:xfrm>
+            <a:off x="5809474" y="3542735"/>
+            <a:ext cx="1113431" cy="643953"/>
+          </a:xfrm>
+          <a:prstGeom prst="rect">
+            <a:avLst/>
+          </a:prstGeom>
+        </p:spPr>
+        <p:txBody>
+          <a:bodyPr vert="horz" lIns="91440" tIns="45720" rIns="91440" bIns="45720" rtlCol="0" anchor="ctr">
+            <a:normAutofit/>
+          </a:bodyPr>
+          <a:lstStyle>
+            <a:lvl1pPr marL="0" indent="0" algn="ctr" defTabSz="914400" rtl="0" eaLnBrk="1" latinLnBrk="0" hangingPunct="1">
+              <a:lnSpc>
+                <a:spcPct val="90000"/>
+              </a:lnSpc>
+              <a:spcBef>
+                <a:spcPts val="1000"/>
+              </a:spcBef>
+              <a:buFont typeface="Arial" panose="020B0604020202020204" pitchFamily="34" charset="0"/>
+              <a:buNone/>
+              <a:defRPr sz="2400" kern="1200">
+                <a:solidFill>
+                  <a:schemeClr val="tx1"/>
+                </a:solidFill>
+                <a:latin typeface="+mn-lt"/>
+                <a:ea typeface="+mn-ea"/>
+                <a:cs typeface="+mn-cs"/>
+              </a:defRPr>
+            </a:lvl1pPr>
+            <a:lvl2pPr marL="457200" indent="0" algn="ctr" defTabSz="914400" rtl="0" eaLnBrk="1" latinLnBrk="0" hangingPunct="1">
+              <a:lnSpc>
+                <a:spcPct val="90000"/>
+              </a:lnSpc>
+              <a:spcBef>
+                <a:spcPts val="500"/>
+              </a:spcBef>
+              <a:buFont typeface="Arial" panose="020B0604020202020204" pitchFamily="34" charset="0"/>
+              <a:buNone/>
+              <a:defRPr sz="2000" kern="1200">
+                <a:solidFill>
+                  <a:schemeClr val="tx1"/>
+                </a:solidFill>
+                <a:latin typeface="+mn-lt"/>
+                <a:ea typeface="+mn-ea"/>
+                <a:cs typeface="+mn-cs"/>
+              </a:defRPr>
+            </a:lvl2pPr>
+            <a:lvl3pPr marL="914400" indent="0" algn="ctr" defTabSz="914400" rtl="0" eaLnBrk="1" latinLnBrk="0" hangingPunct="1">
+              <a:lnSpc>
+                <a:spcPct val="90000"/>
+              </a:lnSpc>
+              <a:spcBef>
+                <a:spcPts val="500"/>
+              </a:spcBef>
+              <a:buFont typeface="Arial" panose="020B0604020202020204" pitchFamily="34" charset="0"/>
+              <a:buNone/>
+              <a:defRPr sz="1800" kern="1200">
+                <a:solidFill>
+                  <a:schemeClr val="tx1"/>
+                </a:solidFill>
+                <a:latin typeface="+mn-lt"/>
+                <a:ea typeface="+mn-ea"/>
+                <a:cs typeface="+mn-cs"/>
+              </a:defRPr>
+            </a:lvl3pPr>
+            <a:lvl4pPr marL="1371600" indent="0" algn="ctr" defTabSz="914400" rtl="0" eaLnBrk="1" latinLnBrk="0" hangingPunct="1">
+              <a:lnSpc>
+                <a:spcPct val="90000"/>
+              </a:lnSpc>
+              <a:spcBef>
+                <a:spcPts val="500"/>
+              </a:spcBef>
+              <a:buFont typeface="Arial" panose="020B0604020202020204" pitchFamily="34" charset="0"/>
+              <a:buNone/>
+              <a:defRPr sz="1600" kern="1200">
+                <a:solidFill>
+                  <a:schemeClr val="tx1"/>
+                </a:solidFill>
+                <a:latin typeface="+mn-lt"/>
+                <a:ea typeface="+mn-ea"/>
+                <a:cs typeface="+mn-cs"/>
+              </a:defRPr>
+            </a:lvl4pPr>
+            <a:lvl5pPr marL="1828800" indent="0" algn="ctr" defTabSz="914400" rtl="0" eaLnBrk="1" latinLnBrk="0" hangingPunct="1">
+              <a:lnSpc>
+                <a:spcPct val="90000"/>
+              </a:lnSpc>
+              <a:spcBef>
+                <a:spcPts val="500"/>
+              </a:spcBef>
+              <a:buFont typeface="Arial" panose="020B0604020202020204" pitchFamily="34" charset="0"/>
+              <a:buNone/>
+              <a:defRPr sz="1600" kern="1200">
+                <a:solidFill>
+                  <a:schemeClr val="tx1"/>
+                </a:solidFill>
+                <a:latin typeface="+mn-lt"/>
+                <a:ea typeface="+mn-ea"/>
+                <a:cs typeface="+mn-cs"/>
+              </a:defRPr>
+            </a:lvl5pPr>
+            <a:lvl6pPr marL="2286000" indent="0" algn="ctr" defTabSz="914400" rtl="0" eaLnBrk="1" latinLnBrk="0" hangingPunct="1">
+              <a:lnSpc>
+                <a:spcPct val="90000"/>
+              </a:lnSpc>
+              <a:spcBef>
+                <a:spcPts val="500"/>
+              </a:spcBef>
+              <a:buFont typeface="Arial" panose="020B0604020202020204" pitchFamily="34" charset="0"/>
+              <a:buNone/>
+              <a:defRPr sz="1600" kern="1200">
+                <a:solidFill>
+                  <a:schemeClr val="tx1"/>
+                </a:solidFill>
+                <a:latin typeface="+mn-lt"/>
+                <a:ea typeface="+mn-ea"/>
+                <a:cs typeface="+mn-cs"/>
+              </a:defRPr>
+            </a:lvl6pPr>
+            <a:lvl7pPr marL="2743200" indent="0" algn="ctr" defTabSz="914400" rtl="0" eaLnBrk="1" latinLnBrk="0" hangingPunct="1">
+              <a:lnSpc>
+                <a:spcPct val="90000"/>
+              </a:lnSpc>
+              <a:spcBef>
+                <a:spcPts val="500"/>
+              </a:spcBef>
+              <a:buFont typeface="Arial" panose="020B0604020202020204" pitchFamily="34" charset="0"/>
+              <a:buNone/>
+              <a:defRPr sz="1600" kern="1200">
+                <a:solidFill>
+                  <a:schemeClr val="tx1"/>
+                </a:solidFill>
+                <a:latin typeface="+mn-lt"/>
+                <a:ea typeface="+mn-ea"/>
+                <a:cs typeface="+mn-cs"/>
+              </a:defRPr>
+            </a:lvl7pPr>
+            <a:lvl8pPr marL="3200400" indent="0" algn="ctr" defTabSz="914400" rtl="0" eaLnBrk="1" latinLnBrk="0" hangingPunct="1">
+              <a:lnSpc>
+                <a:spcPct val="90000"/>
+              </a:lnSpc>
+              <a:spcBef>
+                <a:spcPts val="500"/>
+              </a:spcBef>
+              <a:buFont typeface="Arial" panose="020B0604020202020204" pitchFamily="34" charset="0"/>
+              <a:buNone/>
+              <a:defRPr sz="1600" kern="1200">
+                <a:solidFill>
+                  <a:schemeClr val="tx1"/>
+                </a:solidFill>
+                <a:latin typeface="+mn-lt"/>
+                <a:ea typeface="+mn-ea"/>
+                <a:cs typeface="+mn-cs"/>
+              </a:defRPr>
+            </a:lvl8pPr>
+            <a:lvl9pPr marL="3657600" indent="0" algn="ctr" defTabSz="914400" rtl="0" eaLnBrk="1" latinLnBrk="0" hangingPunct="1">
+              <a:lnSpc>
+                <a:spcPct val="90000"/>
+              </a:lnSpc>
+              <a:spcBef>
+                <a:spcPts val="500"/>
+              </a:spcBef>
+              <a:buFont typeface="Arial" panose="020B0604020202020204" pitchFamily="34" charset="0"/>
+              <a:buNone/>
+              <a:defRPr sz="1600" kern="1200">
+                <a:solidFill>
+                  <a:schemeClr val="tx1"/>
+                </a:solidFill>
+                <a:latin typeface="+mn-lt"/>
+                <a:ea typeface="+mn-ea"/>
+                <a:cs typeface="+mn-cs"/>
+              </a:defRPr>
+            </a:lvl9pPr>
+          </a:lstStyle>
+          <a:p>
+            <a:r>
+              <a:rPr lang="en-US" sz="2000" dirty="0">
+                <a:latin typeface="Calibri"/>
+                <a:ea typeface="Calibri"/>
+                <a:cs typeface="Calibri"/>
+              </a:rPr>
+              <a:t>(y1, y2)</a:t>
+            </a:r>
+          </a:p>
+        </p:txBody>
+      </p:sp>
+      <p:cxnSp>
+        <p:nvCxnSpPr>
+          <p:cNvPr id="19" name="Straight Arrow Connector 18">
+            <a:extLst>
+              <a:ext uri="{FF2B5EF4-FFF2-40B4-BE49-F238E27FC236}">
+                <a16:creationId xmlns:a16="http://schemas.microsoft.com/office/drawing/2014/main" id="{923FCB01-C4C0-B98E-20E7-9040A910CEB8}"/>
+              </a:ext>
+            </a:extLst>
+          </p:cNvPr>
+          <p:cNvCxnSpPr/>
+          <p:nvPr/>
+        </p:nvCxnSpPr>
+        <p:spPr>
+          <a:xfrm>
+            <a:off x="2721403" y="2393779"/>
+            <a:ext cx="936592" cy="4251"/>
+          </a:xfrm>
+          <a:prstGeom prst="straightConnector1">
+            <a:avLst/>
+          </a:prstGeom>
+          <a:ln>
+            <a:tailEnd type="triangle"/>
+          </a:ln>
+        </p:spPr>
+        <p:style>
+          <a:lnRef idx="2">
+            <a:schemeClr val="accent1"/>
+          </a:lnRef>
+          <a:fillRef idx="0">
+            <a:schemeClr val="accent1"/>
+          </a:fillRef>
+          <a:effectRef idx="1">
+            <a:schemeClr val="accent1"/>
+          </a:effectRef>
+          <a:fontRef idx="minor">
+            <a:schemeClr val="tx1"/>
+          </a:fontRef>
+        </p:style>
+      </p:cxnSp>
+      <p:cxnSp>
+        <p:nvCxnSpPr>
+          <p:cNvPr id="20" name="Straight Arrow Connector 19">
+            <a:extLst>
+              <a:ext uri="{FF2B5EF4-FFF2-40B4-BE49-F238E27FC236}">
+                <a16:creationId xmlns:a16="http://schemas.microsoft.com/office/drawing/2014/main" id="{6FCE6CB3-F5CB-BA7B-48CA-8792D44FDBDE}"/>
+              </a:ext>
+            </a:extLst>
+          </p:cNvPr>
+          <p:cNvCxnSpPr>
+            <a:cxnSpLocks/>
+          </p:cNvCxnSpPr>
+          <p:nvPr/>
+        </p:nvCxnSpPr>
+        <p:spPr>
+          <a:xfrm flipV="1">
+            <a:off x="5120751" y="1781497"/>
+            <a:ext cx="1025469" cy="573536"/>
+          </a:xfrm>
+          <a:prstGeom prst="straightConnector1">
+            <a:avLst/>
+          </a:prstGeom>
+          <a:ln>
+            <a:tailEnd type="triangle"/>
+          </a:ln>
+        </p:spPr>
+        <p:style>
+          <a:lnRef idx="2">
+            <a:schemeClr val="accent1"/>
+          </a:lnRef>
+          <a:fillRef idx="0">
+            <a:schemeClr val="accent1"/>
+          </a:fillRef>
+          <a:effectRef idx="1">
+            <a:schemeClr val="accent1"/>
+          </a:effectRef>
+          <a:fontRef idx="minor">
+            <a:schemeClr val="tx1"/>
+          </a:fontRef>
+        </p:style>
+      </p:cxnSp>
+      <p:sp>
+        <p:nvSpPr>
+          <p:cNvPr id="8" name="Right Brace 7">
+            <a:extLst>
+              <a:ext uri="{FF2B5EF4-FFF2-40B4-BE49-F238E27FC236}">
+                <a16:creationId xmlns:a16="http://schemas.microsoft.com/office/drawing/2014/main" id="{05A53A35-C3BA-BCD9-0033-2C4BB76A2579}"/>
+              </a:ext>
+            </a:extLst>
+          </p:cNvPr>
+          <p:cNvSpPr/>
+          <p:nvPr/>
+        </p:nvSpPr>
+        <p:spPr>
+          <a:xfrm rot="5400000">
+            <a:off x="1446276" y="2518320"/>
+            <a:ext cx="394145" cy="2438398"/>
+          </a:xfrm>
+          <a:prstGeom prst="rightBrace">
+            <a:avLst/>
+          </a:prstGeom>
+        </p:spPr>
+        <p:style>
+          <a:lnRef idx="2">
+            <a:schemeClr val="accent1"/>
+          </a:lnRef>
+          <a:fillRef idx="0">
+            <a:schemeClr val="accent1"/>
+          </a:fillRef>
+          <a:effectRef idx="1">
+            <a:schemeClr val="accent1"/>
+          </a:effectRef>
+          <a:fontRef idx="minor">
+            <a:schemeClr val="tx1"/>
+          </a:fontRef>
+        </p:style>
+        <p:txBody>
+          <a:bodyPr rtlCol="0" anchor="ctr"/>
+          <a:lstStyle/>
+          <a:p>
+            <a:pPr algn="ctr"/>
+            <a:endParaRPr lang="en-US"/>
+          </a:p>
+        </p:txBody>
+      </p:sp>
+      <p:pic>
+        <p:nvPicPr>
+          <p:cNvPr id="14" name="Picture 13" descr="A screenshot of a video camera">
+            <a:extLst>
+              <a:ext uri="{FF2B5EF4-FFF2-40B4-BE49-F238E27FC236}">
+                <a16:creationId xmlns:a16="http://schemas.microsoft.com/office/drawing/2014/main" id="{34DC5D61-97FE-96C2-D075-7871C833FD54}"/>
+              </a:ext>
+            </a:extLst>
+          </p:cNvPr>
+          <p:cNvPicPr>
+            <a:picLocks noChangeAspect="1"/>
+          </p:cNvPicPr>
+          <p:nvPr/>
+        </p:nvPicPr>
+        <p:blipFill>
+          <a:blip r:embed="rId3"/>
+          <a:srcRect l="11561" t="15994" r="64162" b="12350"/>
+          <a:stretch/>
+        </p:blipFill>
+        <p:spPr>
+          <a:xfrm>
+            <a:off x="170447" y="4193509"/>
+            <a:ext cx="2949851" cy="1805662"/>
+          </a:xfrm>
+          <a:prstGeom prst="rect">
+            <a:avLst/>
+          </a:prstGeom>
+        </p:spPr>
+      </p:pic>
+      <p:pic>
+        <p:nvPicPr>
+          <p:cNvPr id="21" name="Picture 20" descr="A screenshot of a video camera">
+            <a:extLst>
+              <a:ext uri="{FF2B5EF4-FFF2-40B4-BE49-F238E27FC236}">
+                <a16:creationId xmlns:a16="http://schemas.microsoft.com/office/drawing/2014/main" id="{11FB42C1-B880-D6F5-3B65-27F7A6CE8A8E}"/>
+              </a:ext>
+            </a:extLst>
+          </p:cNvPr>
+          <p:cNvPicPr>
+            <a:picLocks noChangeAspect="1"/>
+          </p:cNvPicPr>
+          <p:nvPr/>
+        </p:nvPicPr>
+        <p:blipFill>
+          <a:blip r:embed="rId3"/>
+          <a:srcRect l="38944" t="15538" r="36799" b="12749"/>
+          <a:stretch/>
+        </p:blipFill>
+        <p:spPr>
+          <a:xfrm>
+            <a:off x="5805236" y="4193509"/>
+            <a:ext cx="2646705" cy="1656709"/>
+          </a:xfrm>
+          <a:prstGeom prst="rect">
+            <a:avLst/>
+          </a:prstGeom>
+        </p:spPr>
+      </p:pic>
+      <p:pic>
+        <p:nvPicPr>
+          <p:cNvPr id="22" name="Picture 21" descr="A screenshot of a video camera">
+            <a:extLst>
+              <a:ext uri="{FF2B5EF4-FFF2-40B4-BE49-F238E27FC236}">
+                <a16:creationId xmlns:a16="http://schemas.microsoft.com/office/drawing/2014/main" id="{890C3D85-2A5C-D642-9BA9-ED76AE4F5848}"/>
+              </a:ext>
+            </a:extLst>
+          </p:cNvPr>
+          <p:cNvPicPr>
+            <a:picLocks noChangeAspect="1"/>
+          </p:cNvPicPr>
+          <p:nvPr/>
+        </p:nvPicPr>
+        <p:blipFill>
+          <a:blip r:embed="rId3"/>
+          <a:srcRect l="66546" t="14325" r="9196" b="13962"/>
+          <a:stretch/>
+        </p:blipFill>
+        <p:spPr>
+          <a:xfrm>
+            <a:off x="5805236" y="2017798"/>
+            <a:ext cx="2646692" cy="1526369"/>
+          </a:xfrm>
+          <a:prstGeom prst="rect">
+            <a:avLst/>
+          </a:prstGeom>
+        </p:spPr>
+      </p:pic>
+      <p:cxnSp>
+        <p:nvCxnSpPr>
+          <p:cNvPr id="23" name="Straight Arrow Connector 22">
+            <a:extLst>
+              <a:ext uri="{FF2B5EF4-FFF2-40B4-BE49-F238E27FC236}">
+                <a16:creationId xmlns:a16="http://schemas.microsoft.com/office/drawing/2014/main" id="{0C04F36E-0C86-55D9-EC4B-2A1A47962332}"/>
+              </a:ext>
+            </a:extLst>
+          </p:cNvPr>
+          <p:cNvCxnSpPr>
+            <a:cxnSpLocks/>
+          </p:cNvCxnSpPr>
+          <p:nvPr/>
+        </p:nvCxnSpPr>
+        <p:spPr>
+          <a:xfrm>
+            <a:off x="8479566" y="1723374"/>
+            <a:ext cx="1205943" cy="820121"/>
+          </a:xfrm>
+          <a:prstGeom prst="straightConnector1">
+            <a:avLst/>
+          </a:prstGeom>
+          <a:ln>
+            <a:tailEnd type="triangle"/>
+          </a:ln>
+        </p:spPr>
+        <p:style>
+          <a:lnRef idx="2">
+            <a:schemeClr val="accent1"/>
+          </a:lnRef>
+          <a:fillRef idx="0">
+            <a:schemeClr val="accent1"/>
+          </a:fillRef>
+          <a:effectRef idx="1">
+            <a:schemeClr val="accent1"/>
+          </a:effectRef>
+          <a:fontRef idx="minor">
+            <a:schemeClr val="tx1"/>
+          </a:fontRef>
+        </p:style>
+      </p:cxnSp>
+      <p:cxnSp>
+        <p:nvCxnSpPr>
+          <p:cNvPr id="24" name="Straight Arrow Connector 23">
+            <a:extLst>
+              <a:ext uri="{FF2B5EF4-FFF2-40B4-BE49-F238E27FC236}">
+                <a16:creationId xmlns:a16="http://schemas.microsoft.com/office/drawing/2014/main" id="{8DCEC4F8-2280-7CE9-5DF2-B122183A1056}"/>
+              </a:ext>
+            </a:extLst>
+          </p:cNvPr>
+          <p:cNvCxnSpPr>
+            <a:cxnSpLocks/>
+          </p:cNvCxnSpPr>
+          <p:nvPr/>
+        </p:nvCxnSpPr>
+        <p:spPr>
+          <a:xfrm flipV="1">
+            <a:off x="8559776" y="2804176"/>
+            <a:ext cx="1115707" cy="1044776"/>
+          </a:xfrm>
+          <a:prstGeom prst="straightConnector1">
+            <a:avLst/>
+          </a:prstGeom>
+          <a:ln>
+            <a:tailEnd type="triangle"/>
+          </a:ln>
+        </p:spPr>
+        <p:style>
+          <a:lnRef idx="2">
+            <a:schemeClr val="accent1"/>
+          </a:lnRef>
+          <a:fillRef idx="0">
+            <a:schemeClr val="accent1"/>
+          </a:fillRef>
+          <a:effectRef idx="1">
+            <a:schemeClr val="accent1"/>
+          </a:effectRef>
+          <a:fontRef idx="minor">
+            <a:schemeClr val="tx1"/>
+          </a:fontRef>
+        </p:style>
+      </p:cxnSp>
+      <p:sp>
+        <p:nvSpPr>
+          <p:cNvPr id="27" name="Subtitle 2">
+            <a:extLst>
+              <a:ext uri="{FF2B5EF4-FFF2-40B4-BE49-F238E27FC236}">
+                <a16:creationId xmlns:a16="http://schemas.microsoft.com/office/drawing/2014/main" id="{13B72384-44D8-0AD1-9908-488AF994904F}"/>
+              </a:ext>
+            </a:extLst>
+          </p:cNvPr>
+          <p:cNvSpPr txBox="1">
+            <a:spLocks/>
+          </p:cNvSpPr>
+          <p:nvPr/>
+        </p:nvSpPr>
+        <p:spPr>
+          <a:xfrm>
+            <a:off x="9715678" y="2189534"/>
+            <a:ext cx="1721053" cy="936364"/>
+          </a:xfrm>
+          <a:prstGeom prst="rect">
+            <a:avLst/>
+          </a:prstGeom>
+        </p:spPr>
+        <p:txBody>
+          <a:bodyPr vert="horz" lIns="91440" tIns="45720" rIns="91440" bIns="45720" rtlCol="0" anchor="ctr">
+            <a:normAutofit fontScale="92500" lnSpcReduction="10000"/>
+          </a:bodyPr>
+          <a:lstStyle>
+            <a:lvl1pPr marL="0" indent="0" algn="ctr" defTabSz="914400" rtl="0" eaLnBrk="1" latinLnBrk="0" hangingPunct="1">
+              <a:lnSpc>
+                <a:spcPct val="90000"/>
+              </a:lnSpc>
+              <a:spcBef>
+                <a:spcPts val="1000"/>
+              </a:spcBef>
+              <a:buFont typeface="Arial" panose="020B0604020202020204" pitchFamily="34" charset="0"/>
+              <a:buNone/>
+              <a:defRPr sz="2400" kern="1200">
+                <a:solidFill>
+                  <a:schemeClr val="tx1"/>
+                </a:solidFill>
+                <a:latin typeface="+mn-lt"/>
+                <a:ea typeface="+mn-ea"/>
+                <a:cs typeface="+mn-cs"/>
+              </a:defRPr>
+            </a:lvl1pPr>
+            <a:lvl2pPr marL="457200" indent="0" algn="ctr" defTabSz="914400" rtl="0" eaLnBrk="1" latinLnBrk="0" hangingPunct="1">
+              <a:lnSpc>
+                <a:spcPct val="90000"/>
+              </a:lnSpc>
+              <a:spcBef>
+                <a:spcPts val="500"/>
+              </a:spcBef>
+              <a:buFont typeface="Arial" panose="020B0604020202020204" pitchFamily="34" charset="0"/>
+              <a:buNone/>
+              <a:defRPr sz="2000" kern="1200">
+                <a:solidFill>
+                  <a:schemeClr val="tx1"/>
+                </a:solidFill>
+                <a:latin typeface="+mn-lt"/>
+                <a:ea typeface="+mn-ea"/>
+                <a:cs typeface="+mn-cs"/>
+              </a:defRPr>
+            </a:lvl2pPr>
+            <a:lvl3pPr marL="914400" indent="0" algn="ctr" defTabSz="914400" rtl="0" eaLnBrk="1" latinLnBrk="0" hangingPunct="1">
+              <a:lnSpc>
+                <a:spcPct val="90000"/>
+              </a:lnSpc>
+              <a:spcBef>
+                <a:spcPts val="500"/>
+              </a:spcBef>
+              <a:buFont typeface="Arial" panose="020B0604020202020204" pitchFamily="34" charset="0"/>
+              <a:buNone/>
+              <a:defRPr sz="1800" kern="1200">
+                <a:solidFill>
+                  <a:schemeClr val="tx1"/>
+                </a:solidFill>
+                <a:latin typeface="+mn-lt"/>
+                <a:ea typeface="+mn-ea"/>
+                <a:cs typeface="+mn-cs"/>
+              </a:defRPr>
+            </a:lvl3pPr>
+            <a:lvl4pPr marL="1371600" indent="0" algn="ctr" defTabSz="914400" rtl="0" eaLnBrk="1" latinLnBrk="0" hangingPunct="1">
+              <a:lnSpc>
+                <a:spcPct val="90000"/>
+              </a:lnSpc>
+              <a:spcBef>
+                <a:spcPts val="500"/>
+              </a:spcBef>
+              <a:buFont typeface="Arial" panose="020B0604020202020204" pitchFamily="34" charset="0"/>
+              <a:buNone/>
+              <a:defRPr sz="1600" kern="1200">
+                <a:solidFill>
+                  <a:schemeClr val="tx1"/>
+                </a:solidFill>
+                <a:latin typeface="+mn-lt"/>
+                <a:ea typeface="+mn-ea"/>
+                <a:cs typeface="+mn-cs"/>
+              </a:defRPr>
+            </a:lvl4pPr>
+            <a:lvl5pPr marL="1828800" indent="0" algn="ctr" defTabSz="914400" rtl="0" eaLnBrk="1" latinLnBrk="0" hangingPunct="1">
+              <a:lnSpc>
+                <a:spcPct val="90000"/>
+              </a:lnSpc>
+              <a:spcBef>
+                <a:spcPts val="500"/>
+              </a:spcBef>
+              <a:buFont typeface="Arial" panose="020B0604020202020204" pitchFamily="34" charset="0"/>
+              <a:buNone/>
+              <a:defRPr sz="1600" kern="1200">
+                <a:solidFill>
+                  <a:schemeClr val="tx1"/>
+                </a:solidFill>
+                <a:latin typeface="+mn-lt"/>
+                <a:ea typeface="+mn-ea"/>
+                <a:cs typeface="+mn-cs"/>
+              </a:defRPr>
+            </a:lvl5pPr>
+            <a:lvl6pPr marL="2286000" indent="0" algn="ctr" defTabSz="914400" rtl="0" eaLnBrk="1" latinLnBrk="0" hangingPunct="1">
+              <a:lnSpc>
+                <a:spcPct val="90000"/>
+              </a:lnSpc>
+              <a:spcBef>
+                <a:spcPts val="500"/>
+              </a:spcBef>
+              <a:buFont typeface="Arial" panose="020B0604020202020204" pitchFamily="34" charset="0"/>
+              <a:buNone/>
+              <a:defRPr sz="1600" kern="1200">
+                <a:solidFill>
+                  <a:schemeClr val="tx1"/>
+                </a:solidFill>
+                <a:latin typeface="+mn-lt"/>
+                <a:ea typeface="+mn-ea"/>
+                <a:cs typeface="+mn-cs"/>
+              </a:defRPr>
+            </a:lvl6pPr>
+            <a:lvl7pPr marL="2743200" indent="0" algn="ctr" defTabSz="914400" rtl="0" eaLnBrk="1" latinLnBrk="0" hangingPunct="1">
+              <a:lnSpc>
+                <a:spcPct val="90000"/>
+              </a:lnSpc>
+              <a:spcBef>
+                <a:spcPts val="500"/>
+              </a:spcBef>
+              <a:buFont typeface="Arial" panose="020B0604020202020204" pitchFamily="34" charset="0"/>
+              <a:buNone/>
+              <a:defRPr sz="1600" kern="1200">
+                <a:solidFill>
+                  <a:schemeClr val="tx1"/>
+                </a:solidFill>
+                <a:latin typeface="+mn-lt"/>
+                <a:ea typeface="+mn-ea"/>
+                <a:cs typeface="+mn-cs"/>
+              </a:defRPr>
+            </a:lvl7pPr>
+            <a:lvl8pPr marL="3200400" indent="0" algn="ctr" defTabSz="914400" rtl="0" eaLnBrk="1" latinLnBrk="0" hangingPunct="1">
+              <a:lnSpc>
+                <a:spcPct val="90000"/>
+              </a:lnSpc>
+              <a:spcBef>
+                <a:spcPts val="500"/>
+              </a:spcBef>
+              <a:buFont typeface="Arial" panose="020B0604020202020204" pitchFamily="34" charset="0"/>
+              <a:buNone/>
+              <a:defRPr sz="1600" kern="1200">
+                <a:solidFill>
+                  <a:schemeClr val="tx1"/>
+                </a:solidFill>
+                <a:latin typeface="+mn-lt"/>
+                <a:ea typeface="+mn-ea"/>
+                <a:cs typeface="+mn-cs"/>
+              </a:defRPr>
+            </a:lvl8pPr>
+            <a:lvl9pPr marL="3657600" indent="0" algn="ctr" defTabSz="914400" rtl="0" eaLnBrk="1" latinLnBrk="0" hangingPunct="1">
+              <a:lnSpc>
+                <a:spcPct val="90000"/>
+              </a:lnSpc>
+              <a:spcBef>
+                <a:spcPts val="500"/>
+              </a:spcBef>
+              <a:buFont typeface="Arial" panose="020B0604020202020204" pitchFamily="34" charset="0"/>
+              <a:buNone/>
+              <a:defRPr sz="1600" kern="1200">
+                <a:solidFill>
+                  <a:schemeClr val="tx1"/>
+                </a:solidFill>
+                <a:latin typeface="+mn-lt"/>
+                <a:ea typeface="+mn-ea"/>
+                <a:cs typeface="+mn-cs"/>
+              </a:defRPr>
+            </a:lvl9pPr>
+          </a:lstStyle>
+          <a:p>
+            <a:r>
+              <a:rPr lang="en-US" sz="2000" dirty="0">
+                <a:latin typeface="Calibri"/>
+                <a:ea typeface="Calibri"/>
+                <a:cs typeface="Calibri"/>
+              </a:rPr>
+              <a:t>P(y|µ, Σ)</a:t>
+            </a:r>
+          </a:p>
+          <a:p>
+            <a:r>
+              <a:rPr lang="en-US" sz="2000" dirty="0" err="1">
+                <a:latin typeface="Calibri"/>
+                <a:ea typeface="Calibri"/>
+                <a:cs typeface="Calibri"/>
+              </a:rPr>
+              <a:t>Mahalanobis</a:t>
+            </a:r>
+            <a:r>
+              <a:rPr lang="en-US" sz="2000" dirty="0">
+                <a:latin typeface="Calibri"/>
+                <a:ea typeface="Calibri"/>
+                <a:cs typeface="Calibri"/>
+              </a:rPr>
+              <a:t> Distance</a:t>
+            </a:r>
+          </a:p>
+        </p:txBody>
+      </p:sp>
+      <p:pic>
+        <p:nvPicPr>
+          <p:cNvPr id="34" name="Picture 33" descr="Outlier Identification Using Mahalanobis Distance | Charles Holbert">
+            <a:extLst>
+              <a:ext uri="{FF2B5EF4-FFF2-40B4-BE49-F238E27FC236}">
+                <a16:creationId xmlns:a16="http://schemas.microsoft.com/office/drawing/2014/main" id="{06D1FF73-8153-A2B9-5B2E-FBD50233BA29}"/>
+              </a:ext>
+            </a:extLst>
+          </p:cNvPr>
+          <p:cNvPicPr>
+            <a:picLocks noChangeAspect="1"/>
+          </p:cNvPicPr>
+          <p:nvPr/>
+        </p:nvPicPr>
+        <p:blipFill>
+          <a:blip r:embed="rId4"/>
+          <a:srcRect l="8791" t="11332" r="15018" b="12072"/>
+          <a:stretch/>
+        </p:blipFill>
+        <p:spPr>
+          <a:xfrm>
+            <a:off x="9617243" y="3219231"/>
+            <a:ext cx="2090058" cy="1805536"/>
+          </a:xfrm>
+          <a:prstGeom prst="rect">
+            <a:avLst/>
+          </a:prstGeom>
+        </p:spPr>
+      </p:pic>
+      <p:cxnSp>
+        <p:nvCxnSpPr>
+          <p:cNvPr id="35" name="Straight Arrow Connector 34">
+            <a:extLst>
+              <a:ext uri="{FF2B5EF4-FFF2-40B4-BE49-F238E27FC236}">
+                <a16:creationId xmlns:a16="http://schemas.microsoft.com/office/drawing/2014/main" id="{E064214F-E074-16AE-7F5A-CE45E83257F2}"/>
+              </a:ext>
+            </a:extLst>
+          </p:cNvPr>
+          <p:cNvCxnSpPr>
+            <a:cxnSpLocks/>
+          </p:cNvCxnSpPr>
+          <p:nvPr/>
+        </p:nvCxnSpPr>
+        <p:spPr>
+          <a:xfrm flipV="1">
+            <a:off x="11266883" y="3917098"/>
+            <a:ext cx="12813" cy="1415749"/>
+          </a:xfrm>
+          <a:prstGeom prst="straightConnector1">
+            <a:avLst/>
+          </a:prstGeom>
+          <a:ln>
+            <a:tailEnd type="triangle"/>
+          </a:ln>
+        </p:spPr>
+        <p:style>
+          <a:lnRef idx="2">
+            <a:schemeClr val="accent1"/>
+          </a:lnRef>
+          <a:fillRef idx="0">
+            <a:schemeClr val="accent1"/>
+          </a:fillRef>
+          <a:effectRef idx="1">
+            <a:schemeClr val="accent1"/>
+          </a:effectRef>
+          <a:fontRef idx="minor">
+            <a:schemeClr val="tx1"/>
+          </a:fontRef>
+        </p:style>
+      </p:cxnSp>
+      <p:sp>
+        <p:nvSpPr>
+          <p:cNvPr id="36" name="Subtitle 2">
+            <a:extLst>
+              <a:ext uri="{FF2B5EF4-FFF2-40B4-BE49-F238E27FC236}">
+                <a16:creationId xmlns:a16="http://schemas.microsoft.com/office/drawing/2014/main" id="{DFB7C37C-EA38-799A-2B09-C07AF26F79D3}"/>
+              </a:ext>
+            </a:extLst>
+          </p:cNvPr>
+          <p:cNvSpPr txBox="1">
+            <a:spLocks/>
+          </p:cNvSpPr>
+          <p:nvPr/>
+        </p:nvSpPr>
+        <p:spPr>
+          <a:xfrm>
+            <a:off x="10320124" y="5257234"/>
+            <a:ext cx="1795221" cy="583796"/>
+          </a:xfrm>
+          <a:prstGeom prst="rect">
+            <a:avLst/>
+          </a:prstGeom>
+        </p:spPr>
+        <p:txBody>
+          <a:bodyPr vert="horz" lIns="91440" tIns="45720" rIns="91440" bIns="45720" rtlCol="0" anchor="ctr">
+            <a:normAutofit/>
+          </a:bodyPr>
+          <a:lstStyle>
+            <a:lvl1pPr marL="0" indent="0" algn="ctr" defTabSz="914400" rtl="0" eaLnBrk="1" latinLnBrk="0" hangingPunct="1">
+              <a:lnSpc>
+                <a:spcPct val="90000"/>
+              </a:lnSpc>
+              <a:spcBef>
+                <a:spcPts val="1000"/>
+              </a:spcBef>
+              <a:buFont typeface="Arial" panose="020B0604020202020204" pitchFamily="34" charset="0"/>
+              <a:buNone/>
+              <a:defRPr sz="2400" kern="1200">
+                <a:solidFill>
+                  <a:schemeClr val="tx1"/>
+                </a:solidFill>
+                <a:latin typeface="+mn-lt"/>
+                <a:ea typeface="+mn-ea"/>
+                <a:cs typeface="+mn-cs"/>
+              </a:defRPr>
+            </a:lvl1pPr>
+            <a:lvl2pPr marL="457200" indent="0" algn="ctr" defTabSz="914400" rtl="0" eaLnBrk="1" latinLnBrk="0" hangingPunct="1">
+              <a:lnSpc>
+                <a:spcPct val="90000"/>
+              </a:lnSpc>
+              <a:spcBef>
+                <a:spcPts val="500"/>
+              </a:spcBef>
+              <a:buFont typeface="Arial" panose="020B0604020202020204" pitchFamily="34" charset="0"/>
+              <a:buNone/>
+              <a:defRPr sz="2000" kern="1200">
+                <a:solidFill>
+                  <a:schemeClr val="tx1"/>
+                </a:solidFill>
+                <a:latin typeface="+mn-lt"/>
+                <a:ea typeface="+mn-ea"/>
+                <a:cs typeface="+mn-cs"/>
+              </a:defRPr>
+            </a:lvl2pPr>
+            <a:lvl3pPr marL="914400" indent="0" algn="ctr" defTabSz="914400" rtl="0" eaLnBrk="1" latinLnBrk="0" hangingPunct="1">
+              <a:lnSpc>
+                <a:spcPct val="90000"/>
+              </a:lnSpc>
+              <a:spcBef>
+                <a:spcPts val="500"/>
+              </a:spcBef>
+              <a:buFont typeface="Arial" panose="020B0604020202020204" pitchFamily="34" charset="0"/>
+              <a:buNone/>
+              <a:defRPr sz="1800" kern="1200">
+                <a:solidFill>
+                  <a:schemeClr val="tx1"/>
+                </a:solidFill>
+                <a:latin typeface="+mn-lt"/>
+                <a:ea typeface="+mn-ea"/>
+                <a:cs typeface="+mn-cs"/>
+              </a:defRPr>
+            </a:lvl3pPr>
+            <a:lvl4pPr marL="1371600" indent="0" algn="ctr" defTabSz="914400" rtl="0" eaLnBrk="1" latinLnBrk="0" hangingPunct="1">
+              <a:lnSpc>
+                <a:spcPct val="90000"/>
+              </a:lnSpc>
+              <a:spcBef>
+                <a:spcPts val="500"/>
+              </a:spcBef>
+              <a:buFont typeface="Arial" panose="020B0604020202020204" pitchFamily="34" charset="0"/>
+              <a:buNone/>
+              <a:defRPr sz="1600" kern="1200">
+                <a:solidFill>
+                  <a:schemeClr val="tx1"/>
+                </a:solidFill>
+                <a:latin typeface="+mn-lt"/>
+                <a:ea typeface="+mn-ea"/>
+                <a:cs typeface="+mn-cs"/>
+              </a:defRPr>
+            </a:lvl4pPr>
+            <a:lvl5pPr marL="1828800" indent="0" algn="ctr" defTabSz="914400" rtl="0" eaLnBrk="1" latinLnBrk="0" hangingPunct="1">
+              <a:lnSpc>
+                <a:spcPct val="90000"/>
+              </a:lnSpc>
+              <a:spcBef>
+                <a:spcPts val="500"/>
+              </a:spcBef>
+              <a:buFont typeface="Arial" panose="020B0604020202020204" pitchFamily="34" charset="0"/>
+              <a:buNone/>
+              <a:defRPr sz="1600" kern="1200">
+                <a:solidFill>
+                  <a:schemeClr val="tx1"/>
+                </a:solidFill>
+                <a:latin typeface="+mn-lt"/>
+                <a:ea typeface="+mn-ea"/>
+                <a:cs typeface="+mn-cs"/>
+              </a:defRPr>
+            </a:lvl5pPr>
+            <a:lvl6pPr marL="2286000" indent="0" algn="ctr" defTabSz="914400" rtl="0" eaLnBrk="1" latinLnBrk="0" hangingPunct="1">
+              <a:lnSpc>
+                <a:spcPct val="90000"/>
+              </a:lnSpc>
+              <a:spcBef>
+                <a:spcPts val="500"/>
+              </a:spcBef>
+              <a:buFont typeface="Arial" panose="020B0604020202020204" pitchFamily="34" charset="0"/>
+              <a:buNone/>
+              <a:defRPr sz="1600" kern="1200">
+                <a:solidFill>
+                  <a:schemeClr val="tx1"/>
+                </a:solidFill>
+                <a:latin typeface="+mn-lt"/>
+                <a:ea typeface="+mn-ea"/>
+                <a:cs typeface="+mn-cs"/>
+              </a:defRPr>
+            </a:lvl6pPr>
+            <a:lvl7pPr marL="2743200" indent="0" algn="ctr" defTabSz="914400" rtl="0" eaLnBrk="1" latinLnBrk="0" hangingPunct="1">
+              <a:lnSpc>
+                <a:spcPct val="90000"/>
+              </a:lnSpc>
+              <a:spcBef>
+                <a:spcPts val="500"/>
+              </a:spcBef>
+              <a:buFont typeface="Arial" panose="020B0604020202020204" pitchFamily="34" charset="0"/>
+              <a:buNone/>
+              <a:defRPr sz="1600" kern="1200">
+                <a:solidFill>
+                  <a:schemeClr val="tx1"/>
+                </a:solidFill>
+                <a:latin typeface="+mn-lt"/>
+                <a:ea typeface="+mn-ea"/>
+                <a:cs typeface="+mn-cs"/>
+              </a:defRPr>
+            </a:lvl7pPr>
+            <a:lvl8pPr marL="3200400" indent="0" algn="ctr" defTabSz="914400" rtl="0" eaLnBrk="1" latinLnBrk="0" hangingPunct="1">
+              <a:lnSpc>
+                <a:spcPct val="90000"/>
+              </a:lnSpc>
+              <a:spcBef>
+                <a:spcPts val="500"/>
+              </a:spcBef>
+              <a:buFont typeface="Arial" panose="020B0604020202020204" pitchFamily="34" charset="0"/>
+              <a:buNone/>
+              <a:defRPr sz="1600" kern="1200">
+                <a:solidFill>
+                  <a:schemeClr val="tx1"/>
+                </a:solidFill>
+                <a:latin typeface="+mn-lt"/>
+                <a:ea typeface="+mn-ea"/>
+                <a:cs typeface="+mn-cs"/>
+              </a:defRPr>
+            </a:lvl8pPr>
+            <a:lvl9pPr marL="3657600" indent="0" algn="ctr" defTabSz="914400" rtl="0" eaLnBrk="1" latinLnBrk="0" hangingPunct="1">
+              <a:lnSpc>
+                <a:spcPct val="90000"/>
+              </a:lnSpc>
+              <a:spcBef>
+                <a:spcPts val="500"/>
+              </a:spcBef>
+              <a:buFont typeface="Arial" panose="020B0604020202020204" pitchFamily="34" charset="0"/>
+              <a:buNone/>
+              <a:defRPr sz="1600" kern="1200">
+                <a:solidFill>
+                  <a:schemeClr val="tx1"/>
+                </a:solidFill>
+                <a:latin typeface="+mn-lt"/>
+                <a:ea typeface="+mn-ea"/>
+                <a:cs typeface="+mn-cs"/>
+              </a:defRPr>
+            </a:lvl9pPr>
+          </a:lstStyle>
+          <a:p>
+            <a:r>
+              <a:rPr lang="en-US" sz="1800" dirty="0">
+                <a:latin typeface="Calibri"/>
+                <a:ea typeface="Calibri"/>
+                <a:cs typeface="Calibri"/>
+              </a:rPr>
+              <a:t>Anomaly</a:t>
+            </a:r>
+          </a:p>
+        </p:txBody>
+      </p:sp>
+      <p:cxnSp>
+        <p:nvCxnSpPr>
+          <p:cNvPr id="37" name="Straight Arrow Connector 36">
+            <a:extLst>
+              <a:ext uri="{FF2B5EF4-FFF2-40B4-BE49-F238E27FC236}">
+                <a16:creationId xmlns:a16="http://schemas.microsoft.com/office/drawing/2014/main" id="{9E46DD93-40BE-FD12-F7EC-EC3DB05E820A}"/>
+              </a:ext>
+            </a:extLst>
+          </p:cNvPr>
+          <p:cNvCxnSpPr>
+            <a:cxnSpLocks/>
+          </p:cNvCxnSpPr>
+          <p:nvPr/>
+        </p:nvCxnSpPr>
+        <p:spPr>
+          <a:xfrm flipV="1">
+            <a:off x="9953435" y="4037415"/>
+            <a:ext cx="674548" cy="1726563"/>
+          </a:xfrm>
+          <a:prstGeom prst="straightConnector1">
+            <a:avLst/>
+          </a:prstGeom>
+          <a:ln>
+            <a:tailEnd type="triangle"/>
+          </a:ln>
+        </p:spPr>
+        <p:style>
+          <a:lnRef idx="2">
+            <a:schemeClr val="accent1"/>
+          </a:lnRef>
+          <a:fillRef idx="0">
+            <a:schemeClr val="accent1"/>
+          </a:fillRef>
+          <a:effectRef idx="1">
+            <a:schemeClr val="accent1"/>
+          </a:effectRef>
+          <a:fontRef idx="minor">
+            <a:schemeClr val="tx1"/>
+          </a:fontRef>
+        </p:style>
+      </p:cxnSp>
+      <p:sp>
+        <p:nvSpPr>
+          <p:cNvPr id="38" name="Subtitle 2">
+            <a:extLst>
+              <a:ext uri="{FF2B5EF4-FFF2-40B4-BE49-F238E27FC236}">
+                <a16:creationId xmlns:a16="http://schemas.microsoft.com/office/drawing/2014/main" id="{885F3A42-5767-9884-C88C-A607E8AC0EB8}"/>
+              </a:ext>
+            </a:extLst>
+          </p:cNvPr>
+          <p:cNvSpPr txBox="1">
+            <a:spLocks/>
+          </p:cNvSpPr>
+          <p:nvPr/>
+        </p:nvSpPr>
+        <p:spPr>
+          <a:xfrm>
+            <a:off x="9006677" y="5638234"/>
+            <a:ext cx="1795221" cy="583796"/>
+          </a:xfrm>
+          <a:prstGeom prst="rect">
+            <a:avLst/>
+          </a:prstGeom>
+        </p:spPr>
+        <p:txBody>
+          <a:bodyPr vert="horz" lIns="91440" tIns="45720" rIns="91440" bIns="45720" rtlCol="0" anchor="ctr">
+            <a:normAutofit/>
+          </a:bodyPr>
+          <a:lstStyle>
+            <a:lvl1pPr marL="0" indent="0" algn="ctr" defTabSz="914400" rtl="0" eaLnBrk="1" latinLnBrk="0" hangingPunct="1">
+              <a:lnSpc>
+                <a:spcPct val="90000"/>
+              </a:lnSpc>
+              <a:spcBef>
+                <a:spcPts val="1000"/>
+              </a:spcBef>
+              <a:buFont typeface="Arial" panose="020B0604020202020204" pitchFamily="34" charset="0"/>
+              <a:buNone/>
+              <a:defRPr sz="2400" kern="1200">
+                <a:solidFill>
+                  <a:schemeClr val="tx1"/>
+                </a:solidFill>
+                <a:latin typeface="+mn-lt"/>
+                <a:ea typeface="+mn-ea"/>
+                <a:cs typeface="+mn-cs"/>
+              </a:defRPr>
+            </a:lvl1pPr>
+            <a:lvl2pPr marL="457200" indent="0" algn="ctr" defTabSz="914400" rtl="0" eaLnBrk="1" latinLnBrk="0" hangingPunct="1">
+              <a:lnSpc>
+                <a:spcPct val="90000"/>
+              </a:lnSpc>
+              <a:spcBef>
+                <a:spcPts val="500"/>
+              </a:spcBef>
+              <a:buFont typeface="Arial" panose="020B0604020202020204" pitchFamily="34" charset="0"/>
+              <a:buNone/>
+              <a:defRPr sz="2000" kern="1200">
+                <a:solidFill>
+                  <a:schemeClr val="tx1"/>
+                </a:solidFill>
+                <a:latin typeface="+mn-lt"/>
+                <a:ea typeface="+mn-ea"/>
+                <a:cs typeface="+mn-cs"/>
+              </a:defRPr>
+            </a:lvl2pPr>
+            <a:lvl3pPr marL="914400" indent="0" algn="ctr" defTabSz="914400" rtl="0" eaLnBrk="1" latinLnBrk="0" hangingPunct="1">
+              <a:lnSpc>
+                <a:spcPct val="90000"/>
+              </a:lnSpc>
+              <a:spcBef>
+                <a:spcPts val="500"/>
+              </a:spcBef>
+              <a:buFont typeface="Arial" panose="020B0604020202020204" pitchFamily="34" charset="0"/>
+              <a:buNone/>
+              <a:defRPr sz="1800" kern="1200">
+                <a:solidFill>
+                  <a:schemeClr val="tx1"/>
+                </a:solidFill>
+                <a:latin typeface="+mn-lt"/>
+                <a:ea typeface="+mn-ea"/>
+                <a:cs typeface="+mn-cs"/>
+              </a:defRPr>
+            </a:lvl3pPr>
+            <a:lvl4pPr marL="1371600" indent="0" algn="ctr" defTabSz="914400" rtl="0" eaLnBrk="1" latinLnBrk="0" hangingPunct="1">
+              <a:lnSpc>
+                <a:spcPct val="90000"/>
+              </a:lnSpc>
+              <a:spcBef>
+                <a:spcPts val="500"/>
+              </a:spcBef>
+              <a:buFont typeface="Arial" panose="020B0604020202020204" pitchFamily="34" charset="0"/>
+              <a:buNone/>
+              <a:defRPr sz="1600" kern="1200">
+                <a:solidFill>
+                  <a:schemeClr val="tx1"/>
+                </a:solidFill>
+                <a:latin typeface="+mn-lt"/>
+                <a:ea typeface="+mn-ea"/>
+                <a:cs typeface="+mn-cs"/>
+              </a:defRPr>
+            </a:lvl4pPr>
+            <a:lvl5pPr marL="1828800" indent="0" algn="ctr" defTabSz="914400" rtl="0" eaLnBrk="1" latinLnBrk="0" hangingPunct="1">
+              <a:lnSpc>
+                <a:spcPct val="90000"/>
+              </a:lnSpc>
+              <a:spcBef>
+                <a:spcPts val="500"/>
+              </a:spcBef>
+              <a:buFont typeface="Arial" panose="020B0604020202020204" pitchFamily="34" charset="0"/>
+              <a:buNone/>
+              <a:defRPr sz="1600" kern="1200">
+                <a:solidFill>
+                  <a:schemeClr val="tx1"/>
+                </a:solidFill>
+                <a:latin typeface="+mn-lt"/>
+                <a:ea typeface="+mn-ea"/>
+                <a:cs typeface="+mn-cs"/>
+              </a:defRPr>
+            </a:lvl5pPr>
+            <a:lvl6pPr marL="2286000" indent="0" algn="ctr" defTabSz="914400" rtl="0" eaLnBrk="1" latinLnBrk="0" hangingPunct="1">
+              <a:lnSpc>
+                <a:spcPct val="90000"/>
+              </a:lnSpc>
+              <a:spcBef>
+                <a:spcPts val="500"/>
+              </a:spcBef>
+              <a:buFont typeface="Arial" panose="020B0604020202020204" pitchFamily="34" charset="0"/>
+              <a:buNone/>
+              <a:defRPr sz="1600" kern="1200">
+                <a:solidFill>
+                  <a:schemeClr val="tx1"/>
+                </a:solidFill>
+                <a:latin typeface="+mn-lt"/>
+                <a:ea typeface="+mn-ea"/>
+                <a:cs typeface="+mn-cs"/>
+              </a:defRPr>
+            </a:lvl6pPr>
+            <a:lvl7pPr marL="2743200" indent="0" algn="ctr" defTabSz="914400" rtl="0" eaLnBrk="1" latinLnBrk="0" hangingPunct="1">
+              <a:lnSpc>
+                <a:spcPct val="90000"/>
+              </a:lnSpc>
+              <a:spcBef>
+                <a:spcPts val="500"/>
+              </a:spcBef>
+              <a:buFont typeface="Arial" panose="020B0604020202020204" pitchFamily="34" charset="0"/>
+              <a:buNone/>
+              <a:defRPr sz="1600" kern="1200">
+                <a:solidFill>
+                  <a:schemeClr val="tx1"/>
+                </a:solidFill>
+                <a:latin typeface="+mn-lt"/>
+                <a:ea typeface="+mn-ea"/>
+                <a:cs typeface="+mn-cs"/>
+              </a:defRPr>
+            </a:lvl7pPr>
+            <a:lvl8pPr marL="3200400" indent="0" algn="ctr" defTabSz="914400" rtl="0" eaLnBrk="1" latinLnBrk="0" hangingPunct="1">
+              <a:lnSpc>
+                <a:spcPct val="90000"/>
+              </a:lnSpc>
+              <a:spcBef>
+                <a:spcPts val="500"/>
+              </a:spcBef>
+              <a:buFont typeface="Arial" panose="020B0604020202020204" pitchFamily="34" charset="0"/>
+              <a:buNone/>
+              <a:defRPr sz="1600" kern="1200">
+                <a:solidFill>
+                  <a:schemeClr val="tx1"/>
+                </a:solidFill>
+                <a:latin typeface="+mn-lt"/>
+                <a:ea typeface="+mn-ea"/>
+                <a:cs typeface="+mn-cs"/>
+              </a:defRPr>
+            </a:lvl8pPr>
+            <a:lvl9pPr marL="3657600" indent="0" algn="ctr" defTabSz="914400" rtl="0" eaLnBrk="1" latinLnBrk="0" hangingPunct="1">
+              <a:lnSpc>
+                <a:spcPct val="90000"/>
+              </a:lnSpc>
+              <a:spcBef>
+                <a:spcPts val="500"/>
+              </a:spcBef>
+              <a:buFont typeface="Arial" panose="020B0604020202020204" pitchFamily="34" charset="0"/>
+              <a:buNone/>
+              <a:defRPr sz="1600" kern="1200">
+                <a:solidFill>
+                  <a:schemeClr val="tx1"/>
+                </a:solidFill>
+                <a:latin typeface="+mn-lt"/>
+                <a:ea typeface="+mn-ea"/>
+                <a:cs typeface="+mn-cs"/>
+              </a:defRPr>
+            </a:lvl9pPr>
+          </a:lstStyle>
+          <a:p>
+            <a:r>
+              <a:rPr lang="en-US" sz="1800" dirty="0">
+                <a:latin typeface="Calibri"/>
+                <a:ea typeface="Calibri"/>
+                <a:cs typeface="Calibri"/>
+              </a:rPr>
+              <a:t>No anomaly</a:t>
+            </a:r>
+          </a:p>
+        </p:txBody>
+      </p:sp>
+    </p:spTree>
+    <p:extLst>
+      <p:ext uri="{BB962C8B-B14F-4D97-AF65-F5344CB8AC3E}">
+        <p14:creationId xmlns:p14="http://schemas.microsoft.com/office/powerpoint/2010/main" val="3164888655"/>
+      </p:ext>
+    </p:extLst>
+  </p:cSld>
+  <p:clrMapOvr>
+    <a:masterClrMapping/>
+  </p:clrMapOvr>
+</p:sld>
+</file>
+
+<file path=ppt/slides/slide2.xml><?xml version="1.0" encoding="utf-8"?>
+<p:sld xmlns:a="http://schemas.openxmlformats.org/drawingml/2006/main" xmlns:r="http://schemas.openxmlformats.org/officeDocument/2006/relationships" xmlns:p="http://schemas.openxmlformats.org/presentationml/2006/main">
+  <p:cSld>
+    <p:spTree>
+      <p:nvGrpSpPr>
         <p:cNvPr id="1" name=""/>
         <p:cNvGrpSpPr/>
         <p:nvPr/>
@@ -5099,7 +7580,7 @@
 </p:sld>
 </file>
 
-<file path=ppt/slides/slide2.xml><?xml version="1.0" encoding="utf-8"?>
+<file path=ppt/slides/slide3.xml><?xml version="1.0" encoding="utf-8"?>
 <p:sld xmlns:a="http://schemas.openxmlformats.org/drawingml/2006/main" xmlns:r="http://schemas.openxmlformats.org/officeDocument/2006/relationships" xmlns:p="http://schemas.openxmlformats.org/presentationml/2006/main">
   <p:cSld>
     <p:spTree>
@@ -8502,7 +10983,7 @@
 </p:sld>
 </file>
 
-<file path=ppt/slides/slide3.xml><?xml version="1.0" encoding="utf-8"?>
+<file path=ppt/slides/slide4.xml><?xml version="1.0" encoding="utf-8"?>
 <p:sld xmlns:a="http://schemas.openxmlformats.org/drawingml/2006/main" xmlns:r="http://schemas.openxmlformats.org/officeDocument/2006/relationships" xmlns:p="http://schemas.openxmlformats.org/presentationml/2006/main">
   <p:cSld>
     <p:spTree>
@@ -9845,7 +12326,7 @@
 </p:sld>
 </file>
 
-<file path=ppt/slides/slide4.xml><?xml version="1.0" encoding="utf-8"?>
+<file path=ppt/slides/slide5.xml><?xml version="1.0" encoding="utf-8"?>
 <p:sld xmlns:a="http://schemas.openxmlformats.org/drawingml/2006/main" xmlns:r="http://schemas.openxmlformats.org/officeDocument/2006/relationships" xmlns:p="http://schemas.openxmlformats.org/presentationml/2006/main">
   <p:cSld>
     <p:spTree>

</xml_diff>